<commit_message>
Added Retos presentation to Andys presentation.
</commit_message>
<xml_diff>
--- a/Recap/Recap_SW8_Andyteil.pptx
+++ b/Recap/Recap_SW8_Andyteil.pptx
@@ -5,16 +5,23 @@
     <p:sldMasterId id="2147483648" r:id="rId1"/>
   </p:sldMasterIdLst>
   <p:notesMasterIdLst>
-    <p:notesMasterId r:id="rId9"/>
+    <p:notesMasterId r:id="rId16"/>
   </p:notesMasterIdLst>
   <p:sldIdLst>
-    <p:sldId id="266" r:id="rId2"/>
-    <p:sldId id="262" r:id="rId3"/>
-    <p:sldId id="263" r:id="rId4"/>
-    <p:sldId id="270" r:id="rId5"/>
-    <p:sldId id="268" r:id="rId6"/>
-    <p:sldId id="267" r:id="rId7"/>
-    <p:sldId id="269" r:id="rId8"/>
+    <p:sldId id="271" r:id="rId2"/>
+    <p:sldId id="266" r:id="rId3"/>
+    <p:sldId id="272" r:id="rId4"/>
+    <p:sldId id="273" r:id="rId5"/>
+    <p:sldId id="274" r:id="rId6"/>
+    <p:sldId id="275" r:id="rId7"/>
+    <p:sldId id="276" r:id="rId8"/>
+    <p:sldId id="262" r:id="rId9"/>
+    <p:sldId id="263" r:id="rId10"/>
+    <p:sldId id="270" r:id="rId11"/>
+    <p:sldId id="268" r:id="rId12"/>
+    <p:sldId id="267" r:id="rId13"/>
+    <p:sldId id="269" r:id="rId14"/>
+    <p:sldId id="277" r:id="rId15"/>
   </p:sldIdLst>
   <p:sldSz cx="9144000" cy="6858000" type="screen4x3"/>
   <p:notesSz cx="6858000" cy="9144000"/>
@@ -198,7 +205,7 @@
           <a:p>
             <a:fld id="{68EAC9E7-2673-47AD-A6C0-6979A29ECFE4}" type="datetimeFigureOut">
               <a:rPr lang="de-CH" smtClean="0"/>
-              <a:t>08.04.2014</a:t>
+              <a:t>09.04.2014</a:t>
             </a:fld>
             <a:endParaRPr lang="de-CH"/>
           </a:p>
@@ -647,7 +654,7 @@
           <a:p>
             <a:fld id="{4CEC8528-00A6-4125-98B0-6CCAFB2BC4BC}" type="datetimeFigureOut">
               <a:rPr lang="de-CH" smtClean="0"/>
-              <a:t>08.04.2014</a:t>
+              <a:t>09.04.2014</a:t>
             </a:fld>
             <a:endParaRPr lang="de-CH"/>
           </a:p>
@@ -817,7 +824,7 @@
           <a:p>
             <a:fld id="{4CEC8528-00A6-4125-98B0-6CCAFB2BC4BC}" type="datetimeFigureOut">
               <a:rPr lang="de-CH" smtClean="0"/>
-              <a:t>08.04.2014</a:t>
+              <a:t>09.04.2014</a:t>
             </a:fld>
             <a:endParaRPr lang="de-CH"/>
           </a:p>
@@ -997,7 +1004,7 @@
           <a:p>
             <a:fld id="{4CEC8528-00A6-4125-98B0-6CCAFB2BC4BC}" type="datetimeFigureOut">
               <a:rPr lang="de-CH" smtClean="0"/>
-              <a:t>08.04.2014</a:t>
+              <a:t>09.04.2014</a:t>
             </a:fld>
             <a:endParaRPr lang="de-CH"/>
           </a:p>
@@ -1167,7 +1174,7 @@
           <a:p>
             <a:fld id="{4CEC8528-00A6-4125-98B0-6CCAFB2BC4BC}" type="datetimeFigureOut">
               <a:rPr lang="de-CH" smtClean="0"/>
-              <a:t>08.04.2014</a:t>
+              <a:t>09.04.2014</a:t>
             </a:fld>
             <a:endParaRPr lang="de-CH"/>
           </a:p>
@@ -1413,7 +1420,7 @@
           <a:p>
             <a:fld id="{4CEC8528-00A6-4125-98B0-6CCAFB2BC4BC}" type="datetimeFigureOut">
               <a:rPr lang="de-CH" smtClean="0"/>
-              <a:t>08.04.2014</a:t>
+              <a:t>09.04.2014</a:t>
             </a:fld>
             <a:endParaRPr lang="de-CH"/>
           </a:p>
@@ -1701,7 +1708,7 @@
           <a:p>
             <a:fld id="{4CEC8528-00A6-4125-98B0-6CCAFB2BC4BC}" type="datetimeFigureOut">
               <a:rPr lang="de-CH" smtClean="0"/>
-              <a:t>08.04.2014</a:t>
+              <a:t>09.04.2014</a:t>
             </a:fld>
             <a:endParaRPr lang="de-CH"/>
           </a:p>
@@ -2123,7 +2130,7 @@
           <a:p>
             <a:fld id="{4CEC8528-00A6-4125-98B0-6CCAFB2BC4BC}" type="datetimeFigureOut">
               <a:rPr lang="de-CH" smtClean="0"/>
-              <a:t>08.04.2014</a:t>
+              <a:t>09.04.2014</a:t>
             </a:fld>
             <a:endParaRPr lang="de-CH"/>
           </a:p>
@@ -2241,7 +2248,7 @@
           <a:p>
             <a:fld id="{4CEC8528-00A6-4125-98B0-6CCAFB2BC4BC}" type="datetimeFigureOut">
               <a:rPr lang="de-CH" smtClean="0"/>
-              <a:t>08.04.2014</a:t>
+              <a:t>09.04.2014</a:t>
             </a:fld>
             <a:endParaRPr lang="de-CH"/>
           </a:p>
@@ -2336,7 +2343,7 @@
           <a:p>
             <a:fld id="{4CEC8528-00A6-4125-98B0-6CCAFB2BC4BC}" type="datetimeFigureOut">
               <a:rPr lang="de-CH" smtClean="0"/>
-              <a:t>08.04.2014</a:t>
+              <a:t>09.04.2014</a:t>
             </a:fld>
             <a:endParaRPr lang="de-CH"/>
           </a:p>
@@ -2613,7 +2620,7 @@
           <a:p>
             <a:fld id="{4CEC8528-00A6-4125-98B0-6CCAFB2BC4BC}" type="datetimeFigureOut">
               <a:rPr lang="de-CH" smtClean="0"/>
-              <a:t>08.04.2014</a:t>
+              <a:t>09.04.2014</a:t>
             </a:fld>
             <a:endParaRPr lang="de-CH"/>
           </a:p>
@@ -2866,7 +2873,7 @@
           <a:p>
             <a:fld id="{4CEC8528-00A6-4125-98B0-6CCAFB2BC4BC}" type="datetimeFigureOut">
               <a:rPr lang="de-CH" smtClean="0"/>
-              <a:t>08.04.2014</a:t>
+              <a:t>09.04.2014</a:t>
             </a:fld>
             <a:endParaRPr lang="de-CH"/>
           </a:p>
@@ -3079,7 +3086,7 @@
           <a:p>
             <a:fld id="{4CEC8528-00A6-4125-98B0-6CCAFB2BC4BC}" type="datetimeFigureOut">
               <a:rPr lang="de-CH" smtClean="0"/>
-              <a:t>08.04.2014</a:t>
+              <a:t>09.04.2014</a:t>
             </a:fld>
             <a:endParaRPr lang="de-CH"/>
           </a:p>
@@ -3454,74 +3461,107 @@
           <a:chExt cx="0" cy="0"/>
         </a:xfrm>
       </p:grpSpPr>
-      <p:pic>
-        <p:nvPicPr>
-          <p:cNvPr id="1027" name="Picture 3"/>
-          <p:cNvPicPr>
-            <a:picLocks noChangeAspect="1" noChangeArrowheads="1"/>
-          </p:cNvPicPr>
-          <p:nvPr/>
-        </p:nvPicPr>
-        <p:blipFill>
-          <a:blip r:embed="rId2">
-            <a:extLst>
-              <a:ext uri="{28A0092B-C50C-407E-A947-70E740481C1C}">
-                <a14:useLocalDpi xmlns:a14="http://schemas.microsoft.com/office/drawing/2010/main" val="0"/>
-              </a:ext>
-            </a:extLst>
-          </a:blip>
-          <a:srcRect/>
-          <a:stretch>
-            <a:fillRect/>
-          </a:stretch>
-        </p:blipFill>
-        <p:spPr bwMode="auto">
-          <a:xfrm>
-            <a:off x="314325" y="1447800"/>
-            <a:ext cx="8515350" cy="3962400"/>
-          </a:xfrm>
-          <a:prstGeom prst="rect">
-            <a:avLst/>
-          </a:prstGeom>
-          <a:noFill/>
-          <a:ln>
-            <a:noFill/>
-          </a:ln>
-          <a:effectLst/>
-          <a:extLst>
-            <a:ext uri="{909E8E84-426E-40DD-AFC4-6F175D3DCCD1}">
-              <a14:hiddenFill xmlns:a14="http://schemas.microsoft.com/office/drawing/2010/main">
-                <a:solidFill>
-                  <a:schemeClr val="accent1"/>
-                </a:solidFill>
-              </a14:hiddenFill>
-            </a:ext>
-            <a:ext uri="{91240B29-F687-4F45-9708-019B960494DF}">
-              <a14:hiddenLine xmlns:a14="http://schemas.microsoft.com/office/drawing/2010/main" w="9525">
-                <a:solidFill>
-                  <a:schemeClr val="tx1"/>
-                </a:solidFill>
-                <a:miter lim="800000"/>
-                <a:headEnd/>
-                <a:tailEnd/>
-              </a14:hiddenLine>
-            </a:ext>
-            <a:ext uri="{AF507438-7753-43E0-B8FC-AC1667EBCBE1}">
-              <a14:hiddenEffects xmlns:a14="http://schemas.microsoft.com/office/drawing/2010/main">
-                <a:effectLst>
-                  <a:outerShdw dist="35921" dir="2700000" algn="ctr" rotWithShape="0">
-                    <a:schemeClr val="bg2"/>
-                  </a:outerShdw>
-                </a:effectLst>
-              </a14:hiddenEffects>
-            </a:ext>
-          </a:extLst>
-        </p:spPr>
-      </p:pic>
+      <p:sp>
+        <p:nvSpPr>
+          <p:cNvPr id="2" name="Title 1"/>
+          <p:cNvSpPr>
+            <a:spLocks noGrp="1"/>
+          </p:cNvSpPr>
+          <p:nvPr>
+            <p:ph type="ctrTitle"/>
+          </p:nvPr>
+        </p:nvSpPr>
+        <p:spPr/>
+        <p:txBody>
+          <a:bodyPr>
+            <a:normAutofit fontScale="90000"/>
+          </a:bodyPr>
+          <a:lstStyle/>
+          <a:p>
+            <a:r>
+              <a:rPr lang="de-CH" dirty="0" smtClean="0"/>
+              <a:t>Shell,</a:t>
+            </a:r>
+            <a:br>
+              <a:rPr lang="de-CH" dirty="0" smtClean="0"/>
+            </a:br>
+            <a:r>
+              <a:rPr lang="de-CH" dirty="0" smtClean="0"/>
+              <a:t>USB </a:t>
+            </a:r>
+            <a:r>
+              <a:rPr lang="de-CH" dirty="0" err="1" smtClean="0"/>
+              <a:t>and</a:t>
+            </a:r>
+            <a:r>
+              <a:rPr lang="de-CH" dirty="0" smtClean="0"/>
+              <a:t> UART,</a:t>
+            </a:r>
+            <a:br>
+              <a:rPr lang="de-CH" dirty="0" smtClean="0"/>
+            </a:br>
+            <a:r>
+              <a:rPr lang="de-CH" dirty="0" smtClean="0"/>
+              <a:t>Memory </a:t>
+            </a:r>
+            <a:r>
+              <a:rPr lang="de-CH" dirty="0" err="1" smtClean="0"/>
+              <a:t>and</a:t>
+            </a:r>
+            <a:r>
+              <a:rPr lang="de-CH" dirty="0" smtClean="0"/>
+              <a:t> Queue</a:t>
+            </a:r>
+            <a:endParaRPr lang="de-CH" dirty="0"/>
+          </a:p>
+        </p:txBody>
+      </p:sp>
+      <p:sp>
+        <p:nvSpPr>
+          <p:cNvPr id="3" name="Subtitle 2"/>
+          <p:cNvSpPr>
+            <a:spLocks noGrp="1"/>
+          </p:cNvSpPr>
+          <p:nvPr>
+            <p:ph type="subTitle" idx="1"/>
+          </p:nvPr>
+        </p:nvSpPr>
+        <p:spPr/>
+        <p:txBody>
+          <a:bodyPr/>
+          <a:lstStyle/>
+          <a:p>
+            <a:r>
+              <a:rPr lang="de-CH" dirty="0" smtClean="0"/>
+              <a:t>Andreas Walker,</a:t>
+            </a:r>
+          </a:p>
+          <a:p>
+            <a:r>
+              <a:rPr lang="de-CH" dirty="0" smtClean="0"/>
+              <a:t>Ruedi </a:t>
+            </a:r>
+            <a:r>
+              <a:rPr lang="de-CH" dirty="0" err="1" smtClean="0"/>
+              <a:t>Herger</a:t>
+            </a:r>
+            <a:r>
+              <a:rPr lang="de-CH" dirty="0" smtClean="0"/>
+              <a:t>,</a:t>
+            </a:r>
+          </a:p>
+          <a:p>
+            <a:r>
+              <a:rPr lang="de-CH" dirty="0" smtClean="0"/>
+              <a:t>Reto Müller</a:t>
+            </a:r>
+          </a:p>
+        </p:txBody>
+      </p:sp>
     </p:spTree>
     <p:extLst>
       <p:ext uri="{BB962C8B-B14F-4D97-AF65-F5344CB8AC3E}">
-        <p14:creationId xmlns:p14="http://schemas.microsoft.com/office/powerpoint/2010/main" val="2531687424"/>
+        <p14:creationId xmlns:p14="http://schemas.microsoft.com/office/powerpoint/2010/main" val="1434591213"/>
       </p:ext>
     </p:extLst>
   </p:cSld>
@@ -3538,288 +3578,7 @@
 </p:sld>
 </file>
 
-<file path=ppt/slides/slide2.xml><?xml version="1.0" encoding="utf-8"?>
-<p:sld xmlns:a="http://schemas.openxmlformats.org/drawingml/2006/main" xmlns:r="http://schemas.openxmlformats.org/officeDocument/2006/relationships" xmlns:p="http://schemas.openxmlformats.org/presentationml/2006/main">
-  <p:cSld>
-    <p:spTree>
-      <p:nvGrpSpPr>
-        <p:cNvPr id="1" name=""/>
-        <p:cNvGrpSpPr/>
-        <p:nvPr/>
-      </p:nvGrpSpPr>
-      <p:grpSpPr>
-        <a:xfrm>
-          <a:off x="0" y="0"/>
-          <a:ext cx="0" cy="0"/>
-          <a:chOff x="0" y="0"/>
-          <a:chExt cx="0" cy="0"/>
-        </a:xfrm>
-      </p:grpSpPr>
-      <p:sp>
-        <p:nvSpPr>
-          <p:cNvPr id="2" name="Title 1"/>
-          <p:cNvSpPr>
-            <a:spLocks noGrp="1"/>
-          </p:cNvSpPr>
-          <p:nvPr>
-            <p:ph type="title"/>
-          </p:nvPr>
-        </p:nvSpPr>
-        <p:spPr/>
-        <p:txBody>
-          <a:bodyPr/>
-          <a:lstStyle/>
-          <a:p>
-            <a:r>
-              <a:rPr lang="de-CH" dirty="0" smtClean="0"/>
-              <a:t>Shell Standard I/O</a:t>
-            </a:r>
-            <a:endParaRPr lang="de-CH" dirty="0"/>
-          </a:p>
-        </p:txBody>
-      </p:sp>
-      <p:sp>
-        <p:nvSpPr>
-          <p:cNvPr id="3" name="Content Placeholder 2"/>
-          <p:cNvSpPr>
-            <a:spLocks noGrp="1"/>
-          </p:cNvSpPr>
-          <p:nvPr>
-            <p:ph idx="1"/>
-          </p:nvPr>
-        </p:nvSpPr>
-        <p:spPr/>
-        <p:txBody>
-          <a:bodyPr/>
-          <a:lstStyle/>
-          <a:p>
-            <a:r>
-              <a:rPr lang="en-US" dirty="0" smtClean="0"/>
-              <a:t> </a:t>
-            </a:r>
-            <a:r>
-              <a:rPr lang="en-US" dirty="0"/>
-              <a:t>I/O structure with callbacks </a:t>
-            </a:r>
-          </a:p>
-          <a:p>
-            <a:pPr marL="457200" lvl="1" indent="0">
-              <a:buNone/>
-            </a:pPr>
-            <a:r>
-              <a:rPr lang="en-US" dirty="0" smtClean="0"/>
-              <a:t> 	 </a:t>
-            </a:r>
-            <a:r>
-              <a:rPr lang="en-US" sz="3200" dirty="0" err="1" smtClean="0"/>
-              <a:t>Stdin</a:t>
-            </a:r>
-            <a:r>
-              <a:rPr lang="en-US" sz="3200" dirty="0"/>
-              <a:t>: read char </a:t>
-            </a:r>
-            <a:r>
-              <a:rPr lang="en-US" sz="3200" dirty="0" smtClean="0"/>
-              <a:t>(Commands)</a:t>
-            </a:r>
-            <a:endParaRPr lang="en-US" sz="3200" dirty="0"/>
-          </a:p>
-          <a:p>
-            <a:pPr marL="0" indent="0">
-              <a:buNone/>
-            </a:pPr>
-            <a:r>
-              <a:rPr lang="en-US" dirty="0" smtClean="0"/>
-              <a:t>	 </a:t>
-            </a:r>
-            <a:r>
-              <a:rPr lang="en-US" dirty="0" err="1"/>
-              <a:t>Stdout</a:t>
-            </a:r>
-            <a:r>
-              <a:rPr lang="en-US" dirty="0"/>
-              <a:t>: write char </a:t>
-            </a:r>
-            <a:r>
-              <a:rPr lang="en-US" dirty="0" smtClean="0"/>
-              <a:t>(Answers)</a:t>
-            </a:r>
-            <a:endParaRPr lang="en-US" dirty="0"/>
-          </a:p>
-          <a:p>
-            <a:pPr marL="0" indent="0">
-              <a:buNone/>
-            </a:pPr>
-            <a:r>
-              <a:rPr lang="en-US" dirty="0" smtClean="0"/>
-              <a:t>	 </a:t>
-            </a:r>
-            <a:r>
-              <a:rPr lang="en-US" dirty="0" err="1" smtClean="0"/>
-              <a:t>Stderr</a:t>
-            </a:r>
-            <a:r>
-              <a:rPr lang="en-US" dirty="0"/>
-              <a:t>: write char </a:t>
-            </a:r>
-            <a:r>
-              <a:rPr lang="en-US" dirty="0" smtClean="0"/>
-              <a:t>(Error)</a:t>
-            </a:r>
-          </a:p>
-          <a:p>
-            <a:pPr marL="0" indent="0">
-              <a:buNone/>
-            </a:pPr>
-            <a:endParaRPr lang="en-US" dirty="0" smtClean="0"/>
-          </a:p>
-        </p:txBody>
-      </p:sp>
-    </p:spTree>
-    <p:extLst>
-      <p:ext uri="{BB962C8B-B14F-4D97-AF65-F5344CB8AC3E}">
-        <p14:creationId xmlns:p14="http://schemas.microsoft.com/office/powerpoint/2010/main" val="1604898833"/>
-      </p:ext>
-    </p:extLst>
-  </p:cSld>
-  <p:clrMapOvr>
-    <a:masterClrMapping/>
-  </p:clrMapOvr>
-  <p:timing>
-    <p:tnLst>
-      <p:par>
-        <p:cTn id="1" dur="indefinite" restart="never" nodeType="tmRoot"/>
-      </p:par>
-    </p:tnLst>
-  </p:timing>
-</p:sld>
-</file>
-
-<file path=ppt/slides/slide3.xml><?xml version="1.0" encoding="utf-8"?>
-<p:sld xmlns:a="http://schemas.openxmlformats.org/drawingml/2006/main" xmlns:r="http://schemas.openxmlformats.org/officeDocument/2006/relationships" xmlns:p="http://schemas.openxmlformats.org/presentationml/2006/main">
-  <p:cSld>
-    <p:spTree>
-      <p:nvGrpSpPr>
-        <p:cNvPr id="1" name=""/>
-        <p:cNvGrpSpPr/>
-        <p:nvPr/>
-      </p:nvGrpSpPr>
-      <p:grpSpPr>
-        <a:xfrm>
-          <a:off x="0" y="0"/>
-          <a:ext cx="0" cy="0"/>
-          <a:chOff x="0" y="0"/>
-          <a:chExt cx="0" cy="0"/>
-        </a:xfrm>
-      </p:grpSpPr>
-      <p:sp>
-        <p:nvSpPr>
-          <p:cNvPr id="2" name="Title 1"/>
-          <p:cNvSpPr>
-            <a:spLocks noGrp="1"/>
-          </p:cNvSpPr>
-          <p:nvPr>
-            <p:ph type="title"/>
-          </p:nvPr>
-        </p:nvSpPr>
-        <p:spPr/>
-        <p:txBody>
-          <a:bodyPr/>
-          <a:lstStyle/>
-          <a:p>
-            <a:r>
-              <a:rPr lang="de-CH" dirty="0" smtClean="0"/>
-              <a:t>Shell Parser</a:t>
-            </a:r>
-            <a:endParaRPr lang="de-CH" dirty="0"/>
-          </a:p>
-        </p:txBody>
-      </p:sp>
-      <p:pic>
-        <p:nvPicPr>
-          <p:cNvPr id="2050" name="Picture 2"/>
-          <p:cNvPicPr>
-            <a:picLocks noChangeAspect="1" noChangeArrowheads="1"/>
-          </p:cNvPicPr>
-          <p:nvPr/>
-        </p:nvPicPr>
-        <p:blipFill>
-          <a:blip r:embed="rId2">
-            <a:extLst>
-              <a:ext uri="{28A0092B-C50C-407E-A947-70E740481C1C}">
-                <a14:useLocalDpi xmlns:a14="http://schemas.microsoft.com/office/drawing/2010/main" val="0"/>
-              </a:ext>
-            </a:extLst>
-          </a:blip>
-          <a:srcRect/>
-          <a:stretch>
-            <a:fillRect/>
-          </a:stretch>
-        </p:blipFill>
-        <p:spPr bwMode="auto">
-          <a:xfrm>
-            <a:off x="179512" y="1844824"/>
-            <a:ext cx="8655233" cy="4097809"/>
-          </a:xfrm>
-          <a:prstGeom prst="rect">
-            <a:avLst/>
-          </a:prstGeom>
-          <a:noFill/>
-          <a:ln>
-            <a:noFill/>
-          </a:ln>
-          <a:effectLst/>
-          <a:extLst>
-            <a:ext uri="{909E8E84-426E-40DD-AFC4-6F175D3DCCD1}">
-              <a14:hiddenFill xmlns:a14="http://schemas.microsoft.com/office/drawing/2010/main">
-                <a:solidFill>
-                  <a:schemeClr val="accent1"/>
-                </a:solidFill>
-              </a14:hiddenFill>
-            </a:ext>
-            <a:ext uri="{91240B29-F687-4F45-9708-019B960494DF}">
-              <a14:hiddenLine xmlns:a14="http://schemas.microsoft.com/office/drawing/2010/main" w="9525">
-                <a:solidFill>
-                  <a:schemeClr val="tx1"/>
-                </a:solidFill>
-                <a:miter lim="800000"/>
-                <a:headEnd/>
-                <a:tailEnd/>
-              </a14:hiddenLine>
-            </a:ext>
-            <a:ext uri="{AF507438-7753-43E0-B8FC-AC1667EBCBE1}">
-              <a14:hiddenEffects xmlns:a14="http://schemas.microsoft.com/office/drawing/2010/main">
-                <a:effectLst>
-                  <a:outerShdw dist="35921" dir="2700000" algn="ctr" rotWithShape="0">
-                    <a:schemeClr val="bg2"/>
-                  </a:outerShdw>
-                </a:effectLst>
-              </a14:hiddenEffects>
-            </a:ext>
-          </a:extLst>
-        </p:spPr>
-      </p:pic>
-    </p:spTree>
-    <p:extLst>
-      <p:ext uri="{BB962C8B-B14F-4D97-AF65-F5344CB8AC3E}">
-        <p14:creationId xmlns:p14="http://schemas.microsoft.com/office/powerpoint/2010/main" val="3487330011"/>
-      </p:ext>
-    </p:extLst>
-  </p:cSld>
-  <p:clrMapOvr>
-    <a:masterClrMapping/>
-  </p:clrMapOvr>
-  <p:timing>
-    <p:tnLst>
-      <p:par>
-        <p:cTn id="1" dur="indefinite" restart="never" nodeType="tmRoot"/>
-      </p:par>
-    </p:tnLst>
-  </p:timing>
-</p:sld>
-</file>
-
-<file path=ppt/slides/slide4.xml><?xml version="1.0" encoding="utf-8"?>
+<file path=ppt/slides/slide10.xml><?xml version="1.0" encoding="utf-8"?>
 <p:sld xmlns:a="http://schemas.openxmlformats.org/drawingml/2006/main" xmlns:r="http://schemas.openxmlformats.org/officeDocument/2006/relationships" xmlns:p="http://schemas.openxmlformats.org/presentationml/2006/main">
   <p:cSld>
     <p:spTree>
@@ -3920,7 +3679,7 @@
 </p:sld>
 </file>
 
-<file path=ppt/slides/slide5.xml><?xml version="1.0" encoding="utf-8"?>
+<file path=ppt/slides/slide11.xml><?xml version="1.0" encoding="utf-8"?>
 <p:sld xmlns:a="http://schemas.openxmlformats.org/drawingml/2006/main" xmlns:r="http://schemas.openxmlformats.org/officeDocument/2006/relationships" xmlns:p="http://schemas.openxmlformats.org/presentationml/2006/main">
   <p:cSld>
     <p:spTree>
@@ -4045,7 +3804,7 @@
 </p:sld>
 </file>
 
-<file path=ppt/slides/slide6.xml><?xml version="1.0" encoding="utf-8"?>
+<file path=ppt/slides/slide12.xml><?xml version="1.0" encoding="utf-8"?>
 <p:sld xmlns:a="http://schemas.openxmlformats.org/drawingml/2006/main" xmlns:r="http://schemas.openxmlformats.org/officeDocument/2006/relationships" xmlns:p="http://schemas.openxmlformats.org/presentationml/2006/main">
   <p:cSld>
     <p:spTree>
@@ -4170,7 +3929,7 @@
 </p:sld>
 </file>
 
-<file path=ppt/slides/slide7.xml><?xml version="1.0" encoding="utf-8"?>
+<file path=ppt/slides/slide13.xml><?xml version="1.0" encoding="utf-8"?>
 <p:sld xmlns:a="http://schemas.openxmlformats.org/drawingml/2006/main" xmlns:r="http://schemas.openxmlformats.org/officeDocument/2006/relationships" xmlns:p="http://schemas.openxmlformats.org/presentationml/2006/main">
   <p:cSld>
     <p:spTree>
@@ -4292,6 +4051,1838 @@
   <p:clrMapOvr>
     <a:masterClrMapping/>
   </p:clrMapOvr>
+</p:sld>
+</file>
+
+<file path=ppt/slides/slide14.xml><?xml version="1.0" encoding="utf-8"?>
+<p:sld xmlns:a="http://schemas.openxmlformats.org/drawingml/2006/main" xmlns:r="http://schemas.openxmlformats.org/officeDocument/2006/relationships" xmlns:p="http://schemas.openxmlformats.org/presentationml/2006/main">
+  <p:cSld>
+    <p:spTree>
+      <p:nvGrpSpPr>
+        <p:cNvPr id="1" name=""/>
+        <p:cNvGrpSpPr/>
+        <p:nvPr/>
+      </p:nvGrpSpPr>
+      <p:grpSpPr>
+        <a:xfrm>
+          <a:off x="0" y="0"/>
+          <a:ext cx="0" cy="0"/>
+          <a:chOff x="0" y="0"/>
+          <a:chExt cx="0" cy="0"/>
+        </a:xfrm>
+      </p:grpSpPr>
+      <p:pic>
+        <p:nvPicPr>
+          <p:cNvPr id="1027" name="Picture 3"/>
+          <p:cNvPicPr>
+            <a:picLocks noChangeAspect="1" noChangeArrowheads="1"/>
+          </p:cNvPicPr>
+          <p:nvPr/>
+        </p:nvPicPr>
+        <p:blipFill>
+          <a:blip r:embed="rId2">
+            <a:extLst>
+              <a:ext uri="{28A0092B-C50C-407E-A947-70E740481C1C}">
+                <a14:useLocalDpi xmlns:a14="http://schemas.microsoft.com/office/drawing/2010/main" val="0"/>
+              </a:ext>
+            </a:extLst>
+          </a:blip>
+          <a:srcRect/>
+          <a:stretch>
+            <a:fillRect/>
+          </a:stretch>
+        </p:blipFill>
+        <p:spPr bwMode="auto">
+          <a:xfrm>
+            <a:off x="314325" y="1447800"/>
+            <a:ext cx="8515350" cy="3962400"/>
+          </a:xfrm>
+          <a:prstGeom prst="rect">
+            <a:avLst/>
+          </a:prstGeom>
+          <a:noFill/>
+          <a:ln>
+            <a:noFill/>
+          </a:ln>
+          <a:effectLst/>
+          <a:extLst>
+            <a:ext uri="{909E8E84-426E-40DD-AFC4-6F175D3DCCD1}">
+              <a14:hiddenFill xmlns:a14="http://schemas.microsoft.com/office/drawing/2010/main">
+                <a:solidFill>
+                  <a:schemeClr val="accent1"/>
+                </a:solidFill>
+              </a14:hiddenFill>
+            </a:ext>
+            <a:ext uri="{91240B29-F687-4F45-9708-019B960494DF}">
+              <a14:hiddenLine xmlns:a14="http://schemas.microsoft.com/office/drawing/2010/main" w="9525">
+                <a:solidFill>
+                  <a:schemeClr val="tx1"/>
+                </a:solidFill>
+                <a:miter lim="800000"/>
+                <a:headEnd/>
+                <a:tailEnd/>
+              </a14:hiddenLine>
+            </a:ext>
+            <a:ext uri="{AF507438-7753-43E0-B8FC-AC1667EBCBE1}">
+              <a14:hiddenEffects xmlns:a14="http://schemas.microsoft.com/office/drawing/2010/main">
+                <a:effectLst>
+                  <a:outerShdw dist="35921" dir="2700000" algn="ctr" rotWithShape="0">
+                    <a:schemeClr val="bg2"/>
+                  </a:outerShdw>
+                </a:effectLst>
+              </a14:hiddenEffects>
+            </a:ext>
+          </a:extLst>
+        </p:spPr>
+      </p:pic>
+    </p:spTree>
+    <p:extLst>
+      <p:ext uri="{BB962C8B-B14F-4D97-AF65-F5344CB8AC3E}">
+        <p14:creationId xmlns:p14="http://schemas.microsoft.com/office/powerpoint/2010/main" val="4107777842"/>
+      </p:ext>
+    </p:extLst>
+  </p:cSld>
+  <p:clrMapOvr>
+    <a:masterClrMapping/>
+  </p:clrMapOvr>
+  <p:timing>
+    <p:tnLst>
+      <p:par>
+        <p:cTn id="1" dur="indefinite" restart="never" nodeType="tmRoot"/>
+      </p:par>
+    </p:tnLst>
+  </p:timing>
+</p:sld>
+</file>
+
+<file path=ppt/slides/slide2.xml><?xml version="1.0" encoding="utf-8"?>
+<p:sld xmlns:a="http://schemas.openxmlformats.org/drawingml/2006/main" xmlns:r="http://schemas.openxmlformats.org/officeDocument/2006/relationships" xmlns:p="http://schemas.openxmlformats.org/presentationml/2006/main">
+  <p:cSld>
+    <p:spTree>
+      <p:nvGrpSpPr>
+        <p:cNvPr id="1" name=""/>
+        <p:cNvGrpSpPr/>
+        <p:nvPr/>
+      </p:nvGrpSpPr>
+      <p:grpSpPr>
+        <a:xfrm>
+          <a:off x="0" y="0"/>
+          <a:ext cx="0" cy="0"/>
+          <a:chOff x="0" y="0"/>
+          <a:chExt cx="0" cy="0"/>
+        </a:xfrm>
+      </p:grpSpPr>
+      <p:pic>
+        <p:nvPicPr>
+          <p:cNvPr id="1027" name="Picture 3"/>
+          <p:cNvPicPr>
+            <a:picLocks noChangeAspect="1" noChangeArrowheads="1"/>
+          </p:cNvPicPr>
+          <p:nvPr/>
+        </p:nvPicPr>
+        <p:blipFill>
+          <a:blip r:embed="rId2">
+            <a:extLst>
+              <a:ext uri="{28A0092B-C50C-407E-A947-70E740481C1C}">
+                <a14:useLocalDpi xmlns:a14="http://schemas.microsoft.com/office/drawing/2010/main" val="0"/>
+              </a:ext>
+            </a:extLst>
+          </a:blip>
+          <a:srcRect/>
+          <a:stretch>
+            <a:fillRect/>
+          </a:stretch>
+        </p:blipFill>
+        <p:spPr bwMode="auto">
+          <a:xfrm>
+            <a:off x="314325" y="1447800"/>
+            <a:ext cx="8515350" cy="3962400"/>
+          </a:xfrm>
+          <a:prstGeom prst="rect">
+            <a:avLst/>
+          </a:prstGeom>
+          <a:noFill/>
+          <a:ln>
+            <a:noFill/>
+          </a:ln>
+          <a:effectLst/>
+          <a:extLst>
+            <a:ext uri="{909E8E84-426E-40DD-AFC4-6F175D3DCCD1}">
+              <a14:hiddenFill xmlns:a14="http://schemas.microsoft.com/office/drawing/2010/main">
+                <a:solidFill>
+                  <a:schemeClr val="accent1"/>
+                </a:solidFill>
+              </a14:hiddenFill>
+            </a:ext>
+            <a:ext uri="{91240B29-F687-4F45-9708-019B960494DF}">
+              <a14:hiddenLine xmlns:a14="http://schemas.microsoft.com/office/drawing/2010/main" w="9525">
+                <a:solidFill>
+                  <a:schemeClr val="tx1"/>
+                </a:solidFill>
+                <a:miter lim="800000"/>
+                <a:headEnd/>
+                <a:tailEnd/>
+              </a14:hiddenLine>
+            </a:ext>
+            <a:ext uri="{AF507438-7753-43E0-B8FC-AC1667EBCBE1}">
+              <a14:hiddenEffects xmlns:a14="http://schemas.microsoft.com/office/drawing/2010/main">
+                <a:effectLst>
+                  <a:outerShdw dist="35921" dir="2700000" algn="ctr" rotWithShape="0">
+                    <a:schemeClr val="bg2"/>
+                  </a:outerShdw>
+                </a:effectLst>
+              </a14:hiddenEffects>
+            </a:ext>
+          </a:extLst>
+        </p:spPr>
+      </p:pic>
+    </p:spTree>
+    <p:extLst>
+      <p:ext uri="{BB962C8B-B14F-4D97-AF65-F5344CB8AC3E}">
+        <p14:creationId xmlns:p14="http://schemas.microsoft.com/office/powerpoint/2010/main" val="2531687424"/>
+      </p:ext>
+    </p:extLst>
+  </p:cSld>
+  <p:clrMapOvr>
+    <a:masterClrMapping/>
+  </p:clrMapOvr>
+  <p:timing>
+    <p:tnLst>
+      <p:par>
+        <p:cTn id="1" dur="indefinite" restart="never" nodeType="tmRoot"/>
+      </p:par>
+    </p:tnLst>
+  </p:timing>
+</p:sld>
+</file>
+
+<file path=ppt/slides/slide3.xml><?xml version="1.0" encoding="utf-8"?>
+<p:sld xmlns:a="http://schemas.openxmlformats.org/drawingml/2006/main" xmlns:r="http://schemas.openxmlformats.org/officeDocument/2006/relationships" xmlns:p="http://schemas.openxmlformats.org/presentationml/2006/main">
+  <p:cSld>
+    <p:spTree>
+      <p:nvGrpSpPr>
+        <p:cNvPr id="1" name=""/>
+        <p:cNvGrpSpPr/>
+        <p:nvPr/>
+      </p:nvGrpSpPr>
+      <p:grpSpPr>
+        <a:xfrm>
+          <a:off x="0" y="0"/>
+          <a:ext cx="0" cy="0"/>
+          <a:chOff x="0" y="0"/>
+          <a:chExt cx="0" cy="0"/>
+        </a:xfrm>
+      </p:grpSpPr>
+      <p:sp>
+        <p:nvSpPr>
+          <p:cNvPr id="2" name="Title 1"/>
+          <p:cNvSpPr>
+            <a:spLocks noGrp="1"/>
+          </p:cNvSpPr>
+          <p:nvPr>
+            <p:ph type="title"/>
+          </p:nvPr>
+        </p:nvSpPr>
+        <p:spPr/>
+        <p:txBody>
+          <a:bodyPr/>
+          <a:lstStyle/>
+          <a:p>
+            <a:r>
+              <a:rPr lang="de-CH" dirty="0" err="1" smtClean="0"/>
+              <a:t>Ways</a:t>
+            </a:r>
+            <a:r>
+              <a:rPr lang="de-CH" dirty="0" smtClean="0"/>
+              <a:t> </a:t>
+            </a:r>
+            <a:r>
+              <a:rPr lang="de-CH" dirty="0" err="1" smtClean="0"/>
+              <a:t>to</a:t>
+            </a:r>
+            <a:r>
+              <a:rPr lang="de-CH" dirty="0" smtClean="0"/>
+              <a:t> </a:t>
+            </a:r>
+            <a:r>
+              <a:rPr lang="de-CH" dirty="0" err="1" smtClean="0"/>
+              <a:t>communicate</a:t>
+            </a:r>
+            <a:endParaRPr lang="de-CH" dirty="0"/>
+          </a:p>
+        </p:txBody>
+      </p:sp>
+      <p:sp>
+        <p:nvSpPr>
+          <p:cNvPr id="3" name="Content Placeholder 2"/>
+          <p:cNvSpPr>
+            <a:spLocks noGrp="1"/>
+          </p:cNvSpPr>
+          <p:nvPr>
+            <p:ph idx="1"/>
+          </p:nvPr>
+        </p:nvSpPr>
+        <p:spPr>
+          <a:xfrm>
+            <a:off x="457200" y="4365104"/>
+            <a:ext cx="8229600" cy="1761059"/>
+          </a:xfrm>
+        </p:spPr>
+        <p:txBody>
+          <a:bodyPr>
+            <a:normAutofit/>
+          </a:bodyPr>
+          <a:lstStyle/>
+          <a:p>
+            <a:r>
+              <a:rPr lang="de-CH" dirty="0" smtClean="0"/>
+              <a:t>Bluetooth </a:t>
+            </a:r>
+            <a:r>
+              <a:rPr lang="de-CH" dirty="0" err="1" smtClean="0"/>
+              <a:t>to</a:t>
+            </a:r>
+            <a:r>
+              <a:rPr lang="de-CH" dirty="0" smtClean="0"/>
+              <a:t> a SCI </a:t>
+            </a:r>
+            <a:r>
+              <a:rPr lang="de-CH" dirty="0" err="1" smtClean="0"/>
+              <a:t>port</a:t>
+            </a:r>
+            <a:r>
+              <a:rPr lang="de-CH" dirty="0" smtClean="0"/>
+              <a:t> </a:t>
+            </a:r>
+            <a:r>
+              <a:rPr lang="de-CH" dirty="0" err="1" smtClean="0"/>
+              <a:t>of</a:t>
+            </a:r>
+            <a:r>
+              <a:rPr lang="de-CH" dirty="0" smtClean="0"/>
+              <a:t> </a:t>
+            </a:r>
+            <a:r>
+              <a:rPr lang="de-CH" dirty="0" err="1" smtClean="0"/>
+              <a:t>the</a:t>
+            </a:r>
+            <a:r>
+              <a:rPr lang="de-CH" dirty="0" smtClean="0"/>
+              <a:t> MCU</a:t>
+            </a:r>
+          </a:p>
+          <a:p>
+            <a:r>
+              <a:rPr lang="de-CH" dirty="0" smtClean="0"/>
+              <a:t>USB </a:t>
+            </a:r>
+            <a:r>
+              <a:rPr lang="de-CH" dirty="0" err="1" smtClean="0"/>
+              <a:t>bridge</a:t>
+            </a:r>
+            <a:r>
+              <a:rPr lang="de-CH" dirty="0" smtClean="0"/>
+              <a:t> </a:t>
+            </a:r>
+            <a:r>
+              <a:rPr lang="de-CH" dirty="0" err="1" smtClean="0"/>
+              <a:t>to</a:t>
+            </a:r>
+            <a:r>
+              <a:rPr lang="de-CH" dirty="0" smtClean="0"/>
+              <a:t> a SCI </a:t>
+            </a:r>
+            <a:r>
+              <a:rPr lang="de-CH" dirty="0" err="1" smtClean="0"/>
+              <a:t>port</a:t>
+            </a:r>
+            <a:r>
+              <a:rPr lang="de-CH" dirty="0" smtClean="0"/>
+              <a:t> </a:t>
+            </a:r>
+            <a:r>
+              <a:rPr lang="de-CH" dirty="0" err="1" smtClean="0"/>
+              <a:t>of</a:t>
+            </a:r>
+            <a:r>
+              <a:rPr lang="de-CH" dirty="0" smtClean="0"/>
+              <a:t> </a:t>
+            </a:r>
+            <a:r>
+              <a:rPr lang="de-CH" dirty="0" err="1" smtClean="0"/>
+              <a:t>the</a:t>
+            </a:r>
+            <a:r>
+              <a:rPr lang="de-CH" dirty="0" smtClean="0"/>
+              <a:t> MCU</a:t>
+            </a:r>
+          </a:p>
+          <a:p>
+            <a:r>
+              <a:rPr lang="de-CH" dirty="0" smtClean="0"/>
+              <a:t>( USB </a:t>
+            </a:r>
+            <a:r>
+              <a:rPr lang="de-CH" dirty="0" err="1" smtClean="0"/>
+              <a:t>directly</a:t>
+            </a:r>
+            <a:r>
+              <a:rPr lang="de-CH" dirty="0" smtClean="0"/>
+              <a:t> </a:t>
+            </a:r>
+            <a:r>
+              <a:rPr lang="de-CH" dirty="0" err="1" smtClean="0"/>
+              <a:t>to</a:t>
+            </a:r>
+            <a:r>
+              <a:rPr lang="de-CH" dirty="0" smtClean="0"/>
+              <a:t> a USB </a:t>
+            </a:r>
+            <a:r>
+              <a:rPr lang="de-CH" dirty="0" err="1" smtClean="0"/>
+              <a:t>port</a:t>
+            </a:r>
+            <a:r>
+              <a:rPr lang="de-CH" dirty="0" smtClean="0"/>
+              <a:t> </a:t>
+            </a:r>
+            <a:r>
+              <a:rPr lang="de-CH" dirty="0" err="1"/>
+              <a:t>of</a:t>
+            </a:r>
+            <a:r>
+              <a:rPr lang="de-CH" dirty="0"/>
+              <a:t> </a:t>
+            </a:r>
+            <a:r>
+              <a:rPr lang="de-CH" dirty="0" err="1"/>
+              <a:t>the</a:t>
+            </a:r>
+            <a:r>
+              <a:rPr lang="de-CH" dirty="0"/>
+              <a:t> </a:t>
+            </a:r>
+            <a:r>
+              <a:rPr lang="de-CH" dirty="0" smtClean="0"/>
+              <a:t>MCU )</a:t>
+            </a:r>
+            <a:endParaRPr lang="de-CH" dirty="0"/>
+          </a:p>
+        </p:txBody>
+      </p:sp>
+      <p:pic>
+        <p:nvPicPr>
+          <p:cNvPr id="1026" name="Picture 2"/>
+          <p:cNvPicPr>
+            <a:picLocks noChangeAspect="1" noChangeArrowheads="1"/>
+          </p:cNvPicPr>
+          <p:nvPr/>
+        </p:nvPicPr>
+        <p:blipFill>
+          <a:blip r:embed="rId2">
+            <a:extLst>
+              <a:ext uri="{28A0092B-C50C-407E-A947-70E740481C1C}">
+                <a14:useLocalDpi xmlns:a14="http://schemas.microsoft.com/office/drawing/2010/main" val="0"/>
+              </a:ext>
+            </a:extLst>
+          </a:blip>
+          <a:srcRect/>
+          <a:stretch>
+            <a:fillRect/>
+          </a:stretch>
+        </p:blipFill>
+        <p:spPr bwMode="auto">
+          <a:xfrm>
+            <a:off x="1938338" y="1556792"/>
+            <a:ext cx="5267325" cy="2362200"/>
+          </a:xfrm>
+          <a:prstGeom prst="rect">
+            <a:avLst/>
+          </a:prstGeom>
+          <a:noFill/>
+          <a:ln>
+            <a:noFill/>
+          </a:ln>
+          <a:extLst>
+            <a:ext uri="{909E8E84-426E-40DD-AFC4-6F175D3DCCD1}">
+              <a14:hiddenFill xmlns:a14="http://schemas.microsoft.com/office/drawing/2010/main">
+                <a:solidFill>
+                  <a:schemeClr val="accent1"/>
+                </a:solidFill>
+              </a14:hiddenFill>
+            </a:ext>
+            <a:ext uri="{91240B29-F687-4F45-9708-019B960494DF}">
+              <a14:hiddenLine xmlns:a14="http://schemas.microsoft.com/office/drawing/2010/main" w="9525">
+                <a:solidFill>
+                  <a:schemeClr val="tx1"/>
+                </a:solidFill>
+                <a:miter lim="800000"/>
+                <a:headEnd/>
+                <a:tailEnd/>
+              </a14:hiddenLine>
+            </a:ext>
+          </a:extLst>
+        </p:spPr>
+      </p:pic>
+    </p:spTree>
+    <p:extLst>
+      <p:ext uri="{BB962C8B-B14F-4D97-AF65-F5344CB8AC3E}">
+        <p14:creationId xmlns:p14="http://schemas.microsoft.com/office/powerpoint/2010/main" val="1224379490"/>
+      </p:ext>
+    </p:extLst>
+  </p:cSld>
+  <p:clrMapOvr>
+    <a:masterClrMapping/>
+  </p:clrMapOvr>
+  <p:timing>
+    <p:tnLst>
+      <p:par>
+        <p:cTn id="1" dur="indefinite" restart="never" nodeType="tmRoot"/>
+      </p:par>
+    </p:tnLst>
+  </p:timing>
+</p:sld>
+</file>
+
+<file path=ppt/slides/slide4.xml><?xml version="1.0" encoding="utf-8"?>
+<p:sld xmlns:a="http://schemas.openxmlformats.org/drawingml/2006/main" xmlns:r="http://schemas.openxmlformats.org/officeDocument/2006/relationships" xmlns:p="http://schemas.openxmlformats.org/presentationml/2006/main">
+  <p:cSld>
+    <p:spTree>
+      <p:nvGrpSpPr>
+        <p:cNvPr id="1" name=""/>
+        <p:cNvGrpSpPr/>
+        <p:nvPr/>
+      </p:nvGrpSpPr>
+      <p:grpSpPr>
+        <a:xfrm>
+          <a:off x="0" y="0"/>
+          <a:ext cx="0" cy="0"/>
+          <a:chOff x="0" y="0"/>
+          <a:chExt cx="0" cy="0"/>
+        </a:xfrm>
+      </p:grpSpPr>
+      <p:sp>
+        <p:nvSpPr>
+          <p:cNvPr id="2" name="Title 1"/>
+          <p:cNvSpPr>
+            <a:spLocks noGrp="1"/>
+          </p:cNvSpPr>
+          <p:nvPr>
+            <p:ph type="title"/>
+          </p:nvPr>
+        </p:nvSpPr>
+        <p:spPr/>
+        <p:txBody>
+          <a:bodyPr>
+            <a:normAutofit/>
+          </a:bodyPr>
+          <a:lstStyle/>
+          <a:p>
+            <a:r>
+              <a:rPr lang="de-CH" dirty="0" smtClean="0"/>
+              <a:t>SCI Serial COM Interface (UART)</a:t>
+            </a:r>
+            <a:endParaRPr lang="de-CH" dirty="0"/>
+          </a:p>
+        </p:txBody>
+      </p:sp>
+      <p:sp>
+        <p:nvSpPr>
+          <p:cNvPr id="3" name="Content Placeholder 2"/>
+          <p:cNvSpPr>
+            <a:spLocks noGrp="1"/>
+          </p:cNvSpPr>
+          <p:nvPr>
+            <p:ph idx="1"/>
+          </p:nvPr>
+        </p:nvSpPr>
+        <p:spPr/>
+        <p:txBody>
+          <a:bodyPr>
+            <a:normAutofit fontScale="77500" lnSpcReduction="20000"/>
+          </a:bodyPr>
+          <a:lstStyle/>
+          <a:p>
+            <a:pPr marL="0" indent="0">
+              <a:buNone/>
+            </a:pPr>
+            <a:r>
+              <a:rPr lang="de-CH" dirty="0" err="1" smtClean="0"/>
+              <a:t>Wires</a:t>
+            </a:r>
+            <a:r>
+              <a:rPr lang="de-CH" dirty="0" smtClean="0"/>
+              <a:t>:</a:t>
+            </a:r>
+          </a:p>
+          <a:p>
+            <a:r>
+              <a:rPr lang="de-CH" dirty="0" err="1" smtClean="0"/>
+              <a:t>Rx</a:t>
+            </a:r>
+            <a:r>
+              <a:rPr lang="de-CH" dirty="0" smtClean="0"/>
+              <a:t>, </a:t>
+            </a:r>
+            <a:r>
+              <a:rPr lang="de-CH" dirty="0" err="1" smtClean="0"/>
+              <a:t>receive</a:t>
+            </a:r>
+            <a:r>
+              <a:rPr lang="de-CH" dirty="0" smtClean="0"/>
+              <a:t> </a:t>
+            </a:r>
+            <a:r>
+              <a:rPr lang="de-CH" dirty="0" err="1" smtClean="0"/>
+              <a:t>line</a:t>
+            </a:r>
+            <a:endParaRPr lang="de-CH" dirty="0" smtClean="0"/>
+          </a:p>
+          <a:p>
+            <a:r>
+              <a:rPr lang="de-CH" dirty="0" err="1" smtClean="0"/>
+              <a:t>Tx</a:t>
+            </a:r>
+            <a:r>
+              <a:rPr lang="de-CH" dirty="0" smtClean="0"/>
+              <a:t>, send </a:t>
+            </a:r>
+            <a:r>
+              <a:rPr lang="de-CH" dirty="0" err="1" smtClean="0"/>
+              <a:t>line</a:t>
+            </a:r>
+            <a:endParaRPr lang="de-CH" dirty="0" smtClean="0"/>
+          </a:p>
+          <a:p>
+            <a:r>
+              <a:rPr lang="de-CH" dirty="0" err="1" smtClean="0"/>
+              <a:t>Additionally</a:t>
+            </a:r>
+            <a:r>
+              <a:rPr lang="de-CH" dirty="0" smtClean="0"/>
+              <a:t>: </a:t>
+            </a:r>
+            <a:r>
+              <a:rPr lang="de-CH" dirty="0" err="1" smtClean="0"/>
+              <a:t>flow</a:t>
+            </a:r>
+            <a:r>
+              <a:rPr lang="de-CH" dirty="0" smtClean="0"/>
+              <a:t> </a:t>
+            </a:r>
+            <a:r>
+              <a:rPr lang="de-CH" dirty="0" err="1" smtClean="0"/>
+              <a:t>control</a:t>
+            </a:r>
+            <a:r>
+              <a:rPr lang="de-CH" dirty="0" smtClean="0"/>
+              <a:t> </a:t>
+            </a:r>
+            <a:r>
+              <a:rPr lang="de-CH" dirty="0" err="1" smtClean="0"/>
+              <a:t>lines</a:t>
+            </a:r>
+            <a:r>
+              <a:rPr lang="de-CH" dirty="0" smtClean="0"/>
+              <a:t> (not </a:t>
+            </a:r>
+            <a:r>
+              <a:rPr lang="de-CH" dirty="0" err="1" smtClean="0"/>
+              <a:t>at</a:t>
+            </a:r>
+            <a:r>
+              <a:rPr lang="de-CH" dirty="0" smtClean="0"/>
+              <a:t> </a:t>
+            </a:r>
+            <a:r>
+              <a:rPr lang="de-CH" dirty="0" err="1" smtClean="0"/>
+              <a:t>the</a:t>
+            </a:r>
+            <a:r>
+              <a:rPr lang="de-CH" dirty="0" smtClean="0"/>
+              <a:t> FRDM)</a:t>
+            </a:r>
+          </a:p>
+          <a:p>
+            <a:endParaRPr lang="de-CH" dirty="0" smtClean="0"/>
+          </a:p>
+          <a:p>
+            <a:pPr marL="0" indent="0">
+              <a:buNone/>
+            </a:pPr>
+            <a:r>
+              <a:rPr lang="de-CH" dirty="0" smtClean="0"/>
+              <a:t>Protocol </a:t>
+            </a:r>
+            <a:r>
+              <a:rPr lang="de-CH" dirty="0" err="1" smtClean="0"/>
+              <a:t>properties</a:t>
+            </a:r>
+            <a:r>
+              <a:rPr lang="de-CH" dirty="0" smtClean="0"/>
+              <a:t>:</a:t>
+            </a:r>
+          </a:p>
+          <a:p>
+            <a:r>
+              <a:rPr lang="de-CH" dirty="0" smtClean="0"/>
+              <a:t>Asynchron, </a:t>
+            </a:r>
+            <a:r>
+              <a:rPr lang="de-CH" dirty="0" err="1" smtClean="0"/>
+              <a:t>serial</a:t>
+            </a:r>
+            <a:r>
+              <a:rPr lang="de-CH" dirty="0" smtClean="0"/>
+              <a:t> (</a:t>
+            </a:r>
+            <a:r>
+              <a:rPr lang="de-CH" dirty="0" err="1" smtClean="0"/>
+              <a:t>no</a:t>
+            </a:r>
+            <a:r>
+              <a:rPr lang="de-CH" dirty="0" smtClean="0"/>
+              <a:t> </a:t>
+            </a:r>
+            <a:r>
+              <a:rPr lang="de-CH" dirty="0" err="1" smtClean="0"/>
+              <a:t>clock</a:t>
+            </a:r>
+            <a:r>
+              <a:rPr lang="de-CH" dirty="0" smtClean="0"/>
+              <a:t>)</a:t>
+            </a:r>
+          </a:p>
+          <a:p>
+            <a:r>
+              <a:rPr lang="de-CH" dirty="0" smtClean="0"/>
+              <a:t>Fixed </a:t>
+            </a:r>
+            <a:r>
+              <a:rPr lang="de-CH" dirty="0" err="1" smtClean="0"/>
+              <a:t>baudrate</a:t>
+            </a:r>
+            <a:endParaRPr lang="de-CH" dirty="0" smtClean="0"/>
+          </a:p>
+          <a:p>
+            <a:endParaRPr lang="de-CH" dirty="0"/>
+          </a:p>
+          <a:p>
+            <a:pPr marL="0" indent="0">
+              <a:buNone/>
+            </a:pPr>
+            <a:r>
+              <a:rPr lang="de-CH" dirty="0" err="1" smtClean="0"/>
+              <a:t>Processor</a:t>
+            </a:r>
+            <a:r>
+              <a:rPr lang="de-CH" dirty="0" smtClean="0"/>
+              <a:t> expert </a:t>
+            </a:r>
+            <a:r>
+              <a:rPr lang="de-CH" dirty="0" err="1" smtClean="0"/>
+              <a:t>component</a:t>
+            </a:r>
+            <a:r>
+              <a:rPr lang="de-CH" dirty="0" smtClean="0"/>
+              <a:t>: </a:t>
+            </a:r>
+            <a:r>
+              <a:rPr lang="de-CH" dirty="0" err="1" smtClean="0"/>
+              <a:t>AsynchroSerial</a:t>
+            </a:r>
+            <a:endParaRPr lang="de-CH" dirty="0" smtClean="0"/>
+          </a:p>
+          <a:p>
+            <a:pPr marL="0" indent="0">
+              <a:buNone/>
+            </a:pPr>
+            <a:r>
+              <a:rPr lang="de-CH" dirty="0" smtClean="0"/>
+              <a:t>-&gt; </a:t>
+            </a:r>
+            <a:r>
+              <a:rPr lang="de-CH" dirty="0" err="1" smtClean="0"/>
+              <a:t>Used</a:t>
+            </a:r>
+            <a:r>
+              <a:rPr lang="de-CH" dirty="0" smtClean="0"/>
+              <a:t> </a:t>
+            </a:r>
+            <a:r>
+              <a:rPr lang="de-CH" dirty="0" err="1" smtClean="0"/>
+              <a:t>by</a:t>
+            </a:r>
+            <a:r>
+              <a:rPr lang="de-CH" dirty="0" smtClean="0"/>
+              <a:t> </a:t>
+            </a:r>
+            <a:r>
+              <a:rPr lang="de-CH" dirty="0" err="1" smtClean="0"/>
+              <a:t>the</a:t>
+            </a:r>
+            <a:r>
+              <a:rPr lang="de-CH" dirty="0" smtClean="0"/>
+              <a:t> Shell </a:t>
+            </a:r>
+            <a:r>
+              <a:rPr lang="de-CH" dirty="0" err="1" smtClean="0"/>
+              <a:t>and</a:t>
+            </a:r>
+            <a:r>
+              <a:rPr lang="de-CH" dirty="0" smtClean="0"/>
+              <a:t> Bluetooth </a:t>
+            </a:r>
+            <a:r>
+              <a:rPr lang="de-CH" dirty="0" err="1" smtClean="0"/>
+              <a:t>component</a:t>
+            </a:r>
+            <a:endParaRPr lang="de-CH" dirty="0" smtClean="0"/>
+          </a:p>
+        </p:txBody>
+      </p:sp>
+      <p:pic>
+        <p:nvPicPr>
+          <p:cNvPr id="2050" name="Picture 2"/>
+          <p:cNvPicPr>
+            <a:picLocks noChangeAspect="1" noChangeArrowheads="1"/>
+          </p:cNvPicPr>
+          <p:nvPr/>
+        </p:nvPicPr>
+        <p:blipFill>
+          <a:blip r:embed="rId2">
+            <a:extLst>
+              <a:ext uri="{28A0092B-C50C-407E-A947-70E740481C1C}">
+                <a14:useLocalDpi xmlns:a14="http://schemas.microsoft.com/office/drawing/2010/main" val="0"/>
+              </a:ext>
+            </a:extLst>
+          </a:blip>
+          <a:srcRect/>
+          <a:stretch>
+            <a:fillRect/>
+          </a:stretch>
+        </p:blipFill>
+        <p:spPr bwMode="auto">
+          <a:xfrm>
+            <a:off x="5364088" y="3573016"/>
+            <a:ext cx="2781300" cy="1219200"/>
+          </a:xfrm>
+          <a:prstGeom prst="rect">
+            <a:avLst/>
+          </a:prstGeom>
+          <a:noFill/>
+          <a:ln>
+            <a:noFill/>
+          </a:ln>
+          <a:extLst>
+            <a:ext uri="{909E8E84-426E-40DD-AFC4-6F175D3DCCD1}">
+              <a14:hiddenFill xmlns:a14="http://schemas.microsoft.com/office/drawing/2010/main">
+                <a:solidFill>
+                  <a:schemeClr val="accent1"/>
+                </a:solidFill>
+              </a14:hiddenFill>
+            </a:ext>
+            <a:ext uri="{91240B29-F687-4F45-9708-019B960494DF}">
+              <a14:hiddenLine xmlns:a14="http://schemas.microsoft.com/office/drawing/2010/main" w="9525">
+                <a:solidFill>
+                  <a:schemeClr val="tx1"/>
+                </a:solidFill>
+                <a:miter lim="800000"/>
+                <a:headEnd/>
+                <a:tailEnd/>
+              </a14:hiddenLine>
+            </a:ext>
+          </a:extLst>
+        </p:spPr>
+      </p:pic>
+    </p:spTree>
+    <p:extLst>
+      <p:ext uri="{BB962C8B-B14F-4D97-AF65-F5344CB8AC3E}">
+        <p14:creationId xmlns:p14="http://schemas.microsoft.com/office/powerpoint/2010/main" val="4127296903"/>
+      </p:ext>
+    </p:extLst>
+  </p:cSld>
+  <p:clrMapOvr>
+    <a:masterClrMapping/>
+  </p:clrMapOvr>
+  <p:timing>
+    <p:tnLst>
+      <p:par>
+        <p:cTn id="1" dur="indefinite" restart="never" nodeType="tmRoot"/>
+      </p:par>
+    </p:tnLst>
+  </p:timing>
+</p:sld>
+</file>
+
+<file path=ppt/slides/slide5.xml><?xml version="1.0" encoding="utf-8"?>
+<p:sld xmlns:a="http://schemas.openxmlformats.org/drawingml/2006/main" xmlns:r="http://schemas.openxmlformats.org/officeDocument/2006/relationships" xmlns:p="http://schemas.openxmlformats.org/presentationml/2006/main">
+  <p:cSld>
+    <p:spTree>
+      <p:nvGrpSpPr>
+        <p:cNvPr id="1" name=""/>
+        <p:cNvGrpSpPr/>
+        <p:nvPr/>
+      </p:nvGrpSpPr>
+      <p:grpSpPr>
+        <a:xfrm>
+          <a:off x="0" y="0"/>
+          <a:ext cx="0" cy="0"/>
+          <a:chOff x="0" y="0"/>
+          <a:chExt cx="0" cy="0"/>
+        </a:xfrm>
+      </p:grpSpPr>
+      <p:sp>
+        <p:nvSpPr>
+          <p:cNvPr id="2" name="Title 1"/>
+          <p:cNvSpPr>
+            <a:spLocks noGrp="1"/>
+          </p:cNvSpPr>
+          <p:nvPr>
+            <p:ph type="title"/>
+          </p:nvPr>
+        </p:nvSpPr>
+        <p:spPr/>
+        <p:txBody>
+          <a:bodyPr/>
+          <a:lstStyle/>
+          <a:p>
+            <a:r>
+              <a:rPr lang="de-CH" dirty="0" smtClean="0"/>
+              <a:t>USB</a:t>
+            </a:r>
+            <a:endParaRPr lang="de-CH" dirty="0"/>
+          </a:p>
+        </p:txBody>
+      </p:sp>
+      <p:sp>
+        <p:nvSpPr>
+          <p:cNvPr id="3" name="Content Placeholder 2"/>
+          <p:cNvSpPr>
+            <a:spLocks noGrp="1"/>
+          </p:cNvSpPr>
+          <p:nvPr>
+            <p:ph idx="1"/>
+          </p:nvPr>
+        </p:nvSpPr>
+        <p:spPr/>
+        <p:txBody>
+          <a:bodyPr>
+            <a:normAutofit fontScale="70000" lnSpcReduction="20000"/>
+          </a:bodyPr>
+          <a:lstStyle/>
+          <a:p>
+            <a:pPr marL="0" indent="0">
+              <a:buNone/>
+            </a:pPr>
+            <a:r>
+              <a:rPr lang="de-CH" dirty="0" err="1" smtClean="0"/>
+              <a:t>Wires</a:t>
+            </a:r>
+            <a:r>
+              <a:rPr lang="de-CH" dirty="0" smtClean="0"/>
+              <a:t>:</a:t>
+            </a:r>
+          </a:p>
+          <a:p>
+            <a:r>
+              <a:rPr lang="de-CH" dirty="0" smtClean="0"/>
+              <a:t>2 power </a:t>
+            </a:r>
+            <a:r>
+              <a:rPr lang="de-CH" dirty="0" err="1" smtClean="0"/>
+              <a:t>supply</a:t>
+            </a:r>
+            <a:r>
+              <a:rPr lang="de-CH" dirty="0" smtClean="0"/>
+              <a:t> </a:t>
+            </a:r>
+            <a:r>
+              <a:rPr lang="de-CH" dirty="0" err="1" smtClean="0"/>
+              <a:t>lines</a:t>
+            </a:r>
+            <a:endParaRPr lang="de-CH" dirty="0" smtClean="0"/>
+          </a:p>
+          <a:p>
+            <a:r>
+              <a:rPr lang="de-CH" dirty="0" smtClean="0"/>
+              <a:t>2 </a:t>
+            </a:r>
+            <a:r>
+              <a:rPr lang="de-CH" dirty="0" err="1" smtClean="0"/>
+              <a:t>data</a:t>
+            </a:r>
+            <a:r>
+              <a:rPr lang="de-CH" dirty="0" smtClean="0"/>
+              <a:t> </a:t>
+            </a:r>
+            <a:r>
+              <a:rPr lang="de-CH" dirty="0" err="1" smtClean="0"/>
+              <a:t>lines</a:t>
+            </a:r>
+            <a:r>
+              <a:rPr lang="de-CH" dirty="0" smtClean="0"/>
+              <a:t> (differential </a:t>
+            </a:r>
+            <a:r>
+              <a:rPr lang="de-CH" dirty="0" err="1" smtClean="0"/>
+              <a:t>signal</a:t>
+            </a:r>
+            <a:r>
+              <a:rPr lang="de-CH" dirty="0" smtClean="0"/>
+              <a:t>, </a:t>
+            </a:r>
+            <a:r>
+              <a:rPr lang="de-CH" dirty="0" err="1" smtClean="0"/>
+              <a:t>noise</a:t>
+            </a:r>
+            <a:r>
+              <a:rPr lang="de-CH" dirty="0" smtClean="0"/>
+              <a:t> </a:t>
+            </a:r>
+            <a:r>
+              <a:rPr lang="de-CH" dirty="0" err="1" smtClean="0"/>
+              <a:t>resistant</a:t>
+            </a:r>
+            <a:r>
+              <a:rPr lang="de-CH" dirty="0" smtClean="0"/>
+              <a:t>)</a:t>
+            </a:r>
+          </a:p>
+          <a:p>
+            <a:endParaRPr lang="de-CH" dirty="0" smtClean="0"/>
+          </a:p>
+          <a:p>
+            <a:pPr marL="0" indent="0">
+              <a:buNone/>
+            </a:pPr>
+            <a:r>
+              <a:rPr lang="de-CH" dirty="0" smtClean="0"/>
+              <a:t>Device </a:t>
+            </a:r>
+            <a:r>
+              <a:rPr lang="de-CH" dirty="0" err="1" smtClean="0"/>
+              <a:t>types</a:t>
+            </a:r>
+            <a:r>
+              <a:rPr lang="de-CH" dirty="0" smtClean="0"/>
+              <a:t>:</a:t>
+            </a:r>
+            <a:endParaRPr lang="de-CH" dirty="0"/>
+          </a:p>
+          <a:p>
+            <a:r>
+              <a:rPr lang="de-CH" dirty="0" smtClean="0"/>
+              <a:t>Host, </a:t>
+            </a:r>
+            <a:r>
+              <a:rPr lang="de-CH" dirty="0" err="1" smtClean="0"/>
+              <a:t>device</a:t>
+            </a:r>
+            <a:r>
+              <a:rPr lang="de-CH" dirty="0" smtClean="0"/>
+              <a:t>, OTG (On-The-Go)</a:t>
+            </a:r>
+          </a:p>
+          <a:p>
+            <a:endParaRPr lang="de-CH" dirty="0" smtClean="0"/>
+          </a:p>
+          <a:p>
+            <a:pPr marL="0" indent="0">
+              <a:buNone/>
+            </a:pPr>
+            <a:r>
+              <a:rPr lang="de-CH" dirty="0" smtClean="0"/>
+              <a:t>Device </a:t>
+            </a:r>
+            <a:r>
+              <a:rPr lang="de-CH" dirty="0" err="1" smtClean="0"/>
+              <a:t>classes</a:t>
+            </a:r>
+            <a:r>
+              <a:rPr lang="de-CH" dirty="0" smtClean="0"/>
+              <a:t>:</a:t>
+            </a:r>
+            <a:endParaRPr lang="de-CH" dirty="0"/>
+          </a:p>
+          <a:p>
+            <a:r>
+              <a:rPr lang="de-CH" dirty="0" smtClean="0"/>
+              <a:t>CDC (Communication Device Class), HID, MSD, …</a:t>
+            </a:r>
+          </a:p>
+          <a:p>
+            <a:endParaRPr lang="de-CH" dirty="0" smtClean="0"/>
+          </a:p>
+          <a:p>
+            <a:pPr marL="0" indent="0">
+              <a:buNone/>
+            </a:pPr>
+            <a:r>
+              <a:rPr lang="de-CH" dirty="0" smtClean="0"/>
+              <a:t>Protocol </a:t>
+            </a:r>
+            <a:r>
+              <a:rPr lang="de-CH" dirty="0" err="1" smtClean="0"/>
+              <a:t>properties</a:t>
+            </a:r>
+            <a:endParaRPr lang="de-CH" dirty="0" smtClean="0"/>
+          </a:p>
+          <a:p>
+            <a:r>
+              <a:rPr lang="de-CH" dirty="0" smtClean="0"/>
+              <a:t>Not </a:t>
+            </a:r>
+            <a:r>
+              <a:rPr lang="de-CH" dirty="0" err="1" smtClean="0"/>
+              <a:t>bound</a:t>
+            </a:r>
+            <a:r>
+              <a:rPr lang="de-CH" dirty="0" smtClean="0"/>
+              <a:t> </a:t>
+            </a:r>
+            <a:r>
+              <a:rPr lang="de-CH" dirty="0" err="1" smtClean="0"/>
+              <a:t>to</a:t>
+            </a:r>
+            <a:r>
+              <a:rPr lang="de-CH" dirty="0" smtClean="0"/>
+              <a:t> a </a:t>
+            </a:r>
+            <a:r>
+              <a:rPr lang="de-CH" dirty="0" err="1" smtClean="0"/>
+              <a:t>fixed</a:t>
+            </a:r>
+            <a:r>
+              <a:rPr lang="de-CH" dirty="0" smtClean="0"/>
+              <a:t> </a:t>
+            </a:r>
+            <a:r>
+              <a:rPr lang="de-CH" dirty="0" err="1" smtClean="0"/>
+              <a:t>baudrate</a:t>
+            </a:r>
+            <a:endParaRPr lang="de-CH" dirty="0" smtClean="0"/>
+          </a:p>
+          <a:p>
+            <a:r>
+              <a:rPr lang="de-CH" dirty="0" smtClean="0"/>
+              <a:t>Asynchron, </a:t>
+            </a:r>
+            <a:r>
+              <a:rPr lang="de-CH" dirty="0" err="1" smtClean="0"/>
+              <a:t>serial</a:t>
+            </a:r>
+            <a:r>
+              <a:rPr lang="de-CH" dirty="0" smtClean="0"/>
+              <a:t>, </a:t>
+            </a:r>
+            <a:r>
+              <a:rPr lang="de-CH" dirty="0" err="1" smtClean="0"/>
+              <a:t>and</a:t>
+            </a:r>
+            <a:r>
+              <a:rPr lang="de-CH" dirty="0" smtClean="0"/>
+              <a:t> </a:t>
+            </a:r>
+            <a:r>
+              <a:rPr lang="de-CH" dirty="0" err="1" smtClean="0"/>
+              <a:t>asymmetrical</a:t>
+            </a:r>
+            <a:r>
+              <a:rPr lang="de-CH" dirty="0" smtClean="0"/>
+              <a:t> (</a:t>
+            </a:r>
+            <a:r>
+              <a:rPr lang="de-CH" dirty="0" err="1" smtClean="0"/>
+              <a:t>host</a:t>
+            </a:r>
+            <a:r>
+              <a:rPr lang="de-CH" dirty="0" smtClean="0"/>
+              <a:t> </a:t>
+            </a:r>
+            <a:r>
+              <a:rPr lang="de-CH" dirty="0" err="1" smtClean="0"/>
+              <a:t>requests</a:t>
+            </a:r>
+            <a:r>
+              <a:rPr lang="de-CH" dirty="0" smtClean="0"/>
+              <a:t> </a:t>
+            </a:r>
+            <a:r>
+              <a:rPr lang="de-CH" dirty="0" err="1" smtClean="0"/>
+              <a:t>to</a:t>
+            </a:r>
+            <a:r>
+              <a:rPr lang="de-CH" dirty="0" smtClean="0"/>
+              <a:t> send </a:t>
+            </a:r>
+            <a:r>
+              <a:rPr lang="de-CH" dirty="0" err="1" smtClean="0"/>
+              <a:t>data</a:t>
+            </a:r>
+            <a:r>
+              <a:rPr lang="de-CH" dirty="0" smtClean="0"/>
+              <a:t>)</a:t>
+            </a:r>
+          </a:p>
+          <a:p>
+            <a:endParaRPr lang="de-CH" dirty="0" smtClean="0"/>
+          </a:p>
+        </p:txBody>
+      </p:sp>
+    </p:spTree>
+    <p:extLst>
+      <p:ext uri="{BB962C8B-B14F-4D97-AF65-F5344CB8AC3E}">
+        <p14:creationId xmlns:p14="http://schemas.microsoft.com/office/powerpoint/2010/main" val="4085920508"/>
+      </p:ext>
+    </p:extLst>
+  </p:cSld>
+  <p:clrMapOvr>
+    <a:masterClrMapping/>
+  </p:clrMapOvr>
+  <p:timing>
+    <p:tnLst>
+      <p:par>
+        <p:cTn id="1" dur="indefinite" restart="never" nodeType="tmRoot"/>
+      </p:par>
+    </p:tnLst>
+  </p:timing>
+</p:sld>
+</file>
+
+<file path=ppt/slides/slide6.xml><?xml version="1.0" encoding="utf-8"?>
+<p:sld xmlns:a="http://schemas.openxmlformats.org/drawingml/2006/main" xmlns:r="http://schemas.openxmlformats.org/officeDocument/2006/relationships" xmlns:p="http://schemas.openxmlformats.org/presentationml/2006/main">
+  <p:cSld>
+    <p:spTree>
+      <p:nvGrpSpPr>
+        <p:cNvPr id="1" name=""/>
+        <p:cNvGrpSpPr/>
+        <p:nvPr/>
+      </p:nvGrpSpPr>
+      <p:grpSpPr>
+        <a:xfrm>
+          <a:off x="0" y="0"/>
+          <a:ext cx="0" cy="0"/>
+          <a:chOff x="0" y="0"/>
+          <a:chExt cx="0" cy="0"/>
+        </a:xfrm>
+      </p:grpSpPr>
+      <p:sp>
+        <p:nvSpPr>
+          <p:cNvPr id="2" name="Title 1"/>
+          <p:cNvSpPr>
+            <a:spLocks noGrp="1"/>
+          </p:cNvSpPr>
+          <p:nvPr>
+            <p:ph type="title"/>
+          </p:nvPr>
+        </p:nvSpPr>
+        <p:spPr/>
+        <p:txBody>
+          <a:bodyPr/>
+          <a:lstStyle/>
+          <a:p>
+            <a:r>
+              <a:rPr lang="de-CH" dirty="0" err="1" smtClean="0"/>
+              <a:t>OpenSDA</a:t>
+            </a:r>
+            <a:r>
+              <a:rPr lang="de-CH" dirty="0" smtClean="0"/>
+              <a:t> </a:t>
+            </a:r>
+            <a:r>
+              <a:rPr lang="de-CH" dirty="0" err="1" smtClean="0"/>
+              <a:t>and</a:t>
+            </a:r>
+            <a:r>
+              <a:rPr lang="de-CH" dirty="0" smtClean="0"/>
+              <a:t> USB CDC</a:t>
+            </a:r>
+            <a:endParaRPr lang="de-CH" dirty="0"/>
+          </a:p>
+        </p:txBody>
+      </p:sp>
+      <p:sp>
+        <p:nvSpPr>
+          <p:cNvPr id="3" name="Content Placeholder 2"/>
+          <p:cNvSpPr>
+            <a:spLocks noGrp="1"/>
+          </p:cNvSpPr>
+          <p:nvPr>
+            <p:ph idx="1"/>
+          </p:nvPr>
+        </p:nvSpPr>
+        <p:spPr/>
+        <p:txBody>
+          <a:bodyPr/>
+          <a:lstStyle/>
+          <a:p>
+            <a:r>
+              <a:rPr lang="pl-PL" dirty="0" smtClean="0"/>
+              <a:t>K20 </a:t>
+            </a:r>
+            <a:r>
+              <a:rPr lang="de-CH" dirty="0" err="1" smtClean="0"/>
+              <a:t>adapts</a:t>
+            </a:r>
+            <a:r>
+              <a:rPr lang="de-CH" dirty="0" smtClean="0"/>
+              <a:t> </a:t>
+            </a:r>
+            <a:r>
+              <a:rPr lang="pl-PL" dirty="0" smtClean="0"/>
+              <a:t>USB CDC</a:t>
+            </a:r>
+            <a:r>
+              <a:rPr lang="de-CH" dirty="0" smtClean="0"/>
+              <a:t> </a:t>
+            </a:r>
+            <a:r>
+              <a:rPr lang="de-CH" dirty="0" err="1" smtClean="0"/>
+              <a:t>protocol</a:t>
+            </a:r>
+            <a:r>
+              <a:rPr lang="de-CH" dirty="0" smtClean="0"/>
+              <a:t> </a:t>
+            </a:r>
+            <a:r>
+              <a:rPr lang="de-CH" dirty="0" err="1" smtClean="0"/>
+              <a:t>to</a:t>
+            </a:r>
+            <a:r>
+              <a:rPr lang="de-CH" dirty="0" smtClean="0"/>
+              <a:t> </a:t>
+            </a:r>
+            <a:r>
+              <a:rPr lang="de-CH" dirty="0" err="1" smtClean="0"/>
+              <a:t>the</a:t>
+            </a:r>
+            <a:r>
+              <a:rPr lang="de-CH" dirty="0"/>
+              <a:t> KL25Z </a:t>
+            </a:r>
+            <a:r>
+              <a:rPr lang="de-CH" dirty="0" smtClean="0"/>
+              <a:t>SCI (UART) </a:t>
+            </a:r>
+            <a:r>
+              <a:rPr lang="de-CH" dirty="0" err="1" smtClean="0"/>
+              <a:t>protocol</a:t>
+            </a:r>
+            <a:endParaRPr lang="de-CH" dirty="0" smtClean="0"/>
+          </a:p>
+          <a:p>
+            <a:r>
+              <a:rPr lang="de-CH" dirty="0" smtClean="0"/>
+              <a:t>Virtual COM </a:t>
+            </a:r>
+            <a:r>
+              <a:rPr lang="de-CH" dirty="0" err="1" smtClean="0"/>
+              <a:t>port</a:t>
+            </a:r>
+            <a:r>
+              <a:rPr lang="de-CH" dirty="0" smtClean="0"/>
+              <a:t> </a:t>
+            </a:r>
+            <a:r>
+              <a:rPr lang="de-CH" dirty="0" err="1" smtClean="0"/>
+              <a:t>at</a:t>
+            </a:r>
+            <a:r>
+              <a:rPr lang="de-CH" dirty="0" smtClean="0"/>
+              <a:t> </a:t>
+            </a:r>
+            <a:r>
+              <a:rPr lang="de-CH" dirty="0" err="1" smtClean="0"/>
+              <a:t>the</a:t>
+            </a:r>
+            <a:r>
+              <a:rPr lang="de-CH" dirty="0" smtClean="0"/>
+              <a:t> PC (USB CDC)</a:t>
+            </a:r>
+          </a:p>
+          <a:p>
+            <a:pPr lvl="1"/>
+            <a:r>
+              <a:rPr lang="de-CH" dirty="0" err="1" smtClean="0"/>
+              <a:t>Handable</a:t>
+            </a:r>
+            <a:r>
+              <a:rPr lang="de-CH" dirty="0" smtClean="0"/>
+              <a:t> </a:t>
+            </a:r>
+            <a:r>
+              <a:rPr lang="de-CH" dirty="0" err="1" smtClean="0"/>
+              <a:t>like</a:t>
+            </a:r>
+            <a:r>
+              <a:rPr lang="de-CH" dirty="0" smtClean="0"/>
+              <a:t> a UART </a:t>
+            </a:r>
+            <a:r>
+              <a:rPr lang="de-CH" dirty="0" err="1" smtClean="0"/>
+              <a:t>protocol</a:t>
+            </a:r>
+            <a:endParaRPr lang="de-CH" dirty="0" smtClean="0"/>
+          </a:p>
+          <a:p>
+            <a:endParaRPr lang="de-CH" dirty="0" smtClean="0"/>
+          </a:p>
+        </p:txBody>
+      </p:sp>
+      <p:pic>
+        <p:nvPicPr>
+          <p:cNvPr id="3074" name="Picture 2"/>
+          <p:cNvPicPr>
+            <a:picLocks noChangeAspect="1" noChangeArrowheads="1"/>
+          </p:cNvPicPr>
+          <p:nvPr/>
+        </p:nvPicPr>
+        <p:blipFill>
+          <a:blip r:embed="rId2">
+            <a:extLst>
+              <a:ext uri="{28A0092B-C50C-407E-A947-70E740481C1C}">
+                <a14:useLocalDpi xmlns:a14="http://schemas.microsoft.com/office/drawing/2010/main" val="0"/>
+              </a:ext>
+            </a:extLst>
+          </a:blip>
+          <a:srcRect/>
+          <a:stretch>
+            <a:fillRect/>
+          </a:stretch>
+        </p:blipFill>
+        <p:spPr bwMode="auto">
+          <a:xfrm>
+            <a:off x="2348035" y="3861048"/>
+            <a:ext cx="4495800" cy="2800350"/>
+          </a:xfrm>
+          <a:prstGeom prst="rect">
+            <a:avLst/>
+          </a:prstGeom>
+          <a:noFill/>
+          <a:ln>
+            <a:noFill/>
+          </a:ln>
+          <a:extLst>
+            <a:ext uri="{909E8E84-426E-40DD-AFC4-6F175D3DCCD1}">
+              <a14:hiddenFill xmlns:a14="http://schemas.microsoft.com/office/drawing/2010/main">
+                <a:solidFill>
+                  <a:schemeClr val="accent1"/>
+                </a:solidFill>
+              </a14:hiddenFill>
+            </a:ext>
+            <a:ext uri="{91240B29-F687-4F45-9708-019B960494DF}">
+              <a14:hiddenLine xmlns:a14="http://schemas.microsoft.com/office/drawing/2010/main" w="9525">
+                <a:solidFill>
+                  <a:schemeClr val="tx1"/>
+                </a:solidFill>
+                <a:miter lim="800000"/>
+                <a:headEnd/>
+                <a:tailEnd/>
+              </a14:hiddenLine>
+            </a:ext>
+          </a:extLst>
+        </p:spPr>
+      </p:pic>
+    </p:spTree>
+    <p:extLst>
+      <p:ext uri="{BB962C8B-B14F-4D97-AF65-F5344CB8AC3E}">
+        <p14:creationId xmlns:p14="http://schemas.microsoft.com/office/powerpoint/2010/main" val="1986565767"/>
+      </p:ext>
+    </p:extLst>
+  </p:cSld>
+  <p:clrMapOvr>
+    <a:masterClrMapping/>
+  </p:clrMapOvr>
+  <p:timing>
+    <p:tnLst>
+      <p:par>
+        <p:cTn id="1" dur="indefinite" restart="never" nodeType="tmRoot"/>
+      </p:par>
+    </p:tnLst>
+  </p:timing>
+</p:sld>
+</file>
+
+<file path=ppt/slides/slide7.xml><?xml version="1.0" encoding="utf-8"?>
+<p:sld xmlns:a="http://schemas.openxmlformats.org/drawingml/2006/main" xmlns:r="http://schemas.openxmlformats.org/officeDocument/2006/relationships" xmlns:p="http://schemas.openxmlformats.org/presentationml/2006/main">
+  <p:cSld>
+    <p:spTree>
+      <p:nvGrpSpPr>
+        <p:cNvPr id="1" name=""/>
+        <p:cNvGrpSpPr/>
+        <p:nvPr/>
+      </p:nvGrpSpPr>
+      <p:grpSpPr>
+        <a:xfrm>
+          <a:off x="0" y="0"/>
+          <a:ext cx="0" cy="0"/>
+          <a:chOff x="0" y="0"/>
+          <a:chExt cx="0" cy="0"/>
+        </a:xfrm>
+      </p:grpSpPr>
+      <p:pic>
+        <p:nvPicPr>
+          <p:cNvPr id="1027" name="Picture 3"/>
+          <p:cNvPicPr>
+            <a:picLocks noChangeAspect="1" noChangeArrowheads="1"/>
+          </p:cNvPicPr>
+          <p:nvPr/>
+        </p:nvPicPr>
+        <p:blipFill>
+          <a:blip r:embed="rId2">
+            <a:extLst>
+              <a:ext uri="{28A0092B-C50C-407E-A947-70E740481C1C}">
+                <a14:useLocalDpi xmlns:a14="http://schemas.microsoft.com/office/drawing/2010/main" val="0"/>
+              </a:ext>
+            </a:extLst>
+          </a:blip>
+          <a:srcRect/>
+          <a:stretch>
+            <a:fillRect/>
+          </a:stretch>
+        </p:blipFill>
+        <p:spPr bwMode="auto">
+          <a:xfrm>
+            <a:off x="314325" y="1447800"/>
+            <a:ext cx="8515350" cy="3962400"/>
+          </a:xfrm>
+          <a:prstGeom prst="rect">
+            <a:avLst/>
+          </a:prstGeom>
+          <a:noFill/>
+          <a:ln>
+            <a:noFill/>
+          </a:ln>
+          <a:effectLst/>
+          <a:extLst>
+            <a:ext uri="{909E8E84-426E-40DD-AFC4-6F175D3DCCD1}">
+              <a14:hiddenFill xmlns:a14="http://schemas.microsoft.com/office/drawing/2010/main">
+                <a:solidFill>
+                  <a:schemeClr val="accent1"/>
+                </a:solidFill>
+              </a14:hiddenFill>
+            </a:ext>
+            <a:ext uri="{91240B29-F687-4F45-9708-019B960494DF}">
+              <a14:hiddenLine xmlns:a14="http://schemas.microsoft.com/office/drawing/2010/main" w="9525">
+                <a:solidFill>
+                  <a:schemeClr val="tx1"/>
+                </a:solidFill>
+                <a:miter lim="800000"/>
+                <a:headEnd/>
+                <a:tailEnd/>
+              </a14:hiddenLine>
+            </a:ext>
+            <a:ext uri="{AF507438-7753-43E0-B8FC-AC1667EBCBE1}">
+              <a14:hiddenEffects xmlns:a14="http://schemas.microsoft.com/office/drawing/2010/main">
+                <a:effectLst>
+                  <a:outerShdw dist="35921" dir="2700000" algn="ctr" rotWithShape="0">
+                    <a:schemeClr val="bg2"/>
+                  </a:outerShdw>
+                </a:effectLst>
+              </a14:hiddenEffects>
+            </a:ext>
+          </a:extLst>
+        </p:spPr>
+      </p:pic>
+    </p:spTree>
+    <p:extLst>
+      <p:ext uri="{BB962C8B-B14F-4D97-AF65-F5344CB8AC3E}">
+        <p14:creationId xmlns:p14="http://schemas.microsoft.com/office/powerpoint/2010/main" val="4107777842"/>
+      </p:ext>
+    </p:extLst>
+  </p:cSld>
+  <p:clrMapOvr>
+    <a:masterClrMapping/>
+  </p:clrMapOvr>
+  <p:timing>
+    <p:tnLst>
+      <p:par>
+        <p:cTn id="1" dur="indefinite" restart="never" nodeType="tmRoot"/>
+      </p:par>
+    </p:tnLst>
+  </p:timing>
+</p:sld>
+</file>
+
+<file path=ppt/slides/slide8.xml><?xml version="1.0" encoding="utf-8"?>
+<p:sld xmlns:a="http://schemas.openxmlformats.org/drawingml/2006/main" xmlns:r="http://schemas.openxmlformats.org/officeDocument/2006/relationships" xmlns:p="http://schemas.openxmlformats.org/presentationml/2006/main">
+  <p:cSld>
+    <p:spTree>
+      <p:nvGrpSpPr>
+        <p:cNvPr id="1" name=""/>
+        <p:cNvGrpSpPr/>
+        <p:nvPr/>
+      </p:nvGrpSpPr>
+      <p:grpSpPr>
+        <a:xfrm>
+          <a:off x="0" y="0"/>
+          <a:ext cx="0" cy="0"/>
+          <a:chOff x="0" y="0"/>
+          <a:chExt cx="0" cy="0"/>
+        </a:xfrm>
+      </p:grpSpPr>
+      <p:sp>
+        <p:nvSpPr>
+          <p:cNvPr id="2" name="Title 1"/>
+          <p:cNvSpPr>
+            <a:spLocks noGrp="1"/>
+          </p:cNvSpPr>
+          <p:nvPr>
+            <p:ph type="title"/>
+          </p:nvPr>
+        </p:nvSpPr>
+        <p:spPr/>
+        <p:txBody>
+          <a:bodyPr/>
+          <a:lstStyle/>
+          <a:p>
+            <a:r>
+              <a:rPr lang="de-CH" dirty="0" smtClean="0"/>
+              <a:t>Shell Standard I/O</a:t>
+            </a:r>
+            <a:endParaRPr lang="de-CH" dirty="0"/>
+          </a:p>
+        </p:txBody>
+      </p:sp>
+      <p:sp>
+        <p:nvSpPr>
+          <p:cNvPr id="3" name="Content Placeholder 2"/>
+          <p:cNvSpPr>
+            <a:spLocks noGrp="1"/>
+          </p:cNvSpPr>
+          <p:nvPr>
+            <p:ph idx="1"/>
+          </p:nvPr>
+        </p:nvSpPr>
+        <p:spPr/>
+        <p:txBody>
+          <a:bodyPr/>
+          <a:lstStyle/>
+          <a:p>
+            <a:r>
+              <a:rPr lang="en-US" dirty="0" smtClean="0"/>
+              <a:t> </a:t>
+            </a:r>
+            <a:r>
+              <a:rPr lang="en-US" dirty="0"/>
+              <a:t>I/O structure with callbacks </a:t>
+            </a:r>
+          </a:p>
+          <a:p>
+            <a:pPr marL="457200" lvl="1" indent="0">
+              <a:buNone/>
+            </a:pPr>
+            <a:r>
+              <a:rPr lang="en-US" dirty="0" smtClean="0"/>
+              <a:t> 	 </a:t>
+            </a:r>
+            <a:r>
+              <a:rPr lang="en-US" sz="3200" dirty="0" err="1" smtClean="0"/>
+              <a:t>Stdin</a:t>
+            </a:r>
+            <a:r>
+              <a:rPr lang="en-US" sz="3200" dirty="0"/>
+              <a:t>: read char </a:t>
+            </a:r>
+            <a:r>
+              <a:rPr lang="en-US" sz="3200" dirty="0" smtClean="0"/>
+              <a:t>(Commands)</a:t>
+            </a:r>
+            <a:endParaRPr lang="en-US" sz="3200" dirty="0"/>
+          </a:p>
+          <a:p>
+            <a:pPr marL="0" indent="0">
+              <a:buNone/>
+            </a:pPr>
+            <a:r>
+              <a:rPr lang="en-US" dirty="0" smtClean="0"/>
+              <a:t>	 </a:t>
+            </a:r>
+            <a:r>
+              <a:rPr lang="en-US" dirty="0" err="1"/>
+              <a:t>Stdout</a:t>
+            </a:r>
+            <a:r>
+              <a:rPr lang="en-US" dirty="0"/>
+              <a:t>: write char </a:t>
+            </a:r>
+            <a:r>
+              <a:rPr lang="en-US" dirty="0" smtClean="0"/>
+              <a:t>(Answers)</a:t>
+            </a:r>
+            <a:endParaRPr lang="en-US" dirty="0"/>
+          </a:p>
+          <a:p>
+            <a:pPr marL="0" indent="0">
+              <a:buNone/>
+            </a:pPr>
+            <a:r>
+              <a:rPr lang="en-US" dirty="0" smtClean="0"/>
+              <a:t>	 </a:t>
+            </a:r>
+            <a:r>
+              <a:rPr lang="en-US" dirty="0" err="1" smtClean="0"/>
+              <a:t>Stderr</a:t>
+            </a:r>
+            <a:r>
+              <a:rPr lang="en-US" dirty="0"/>
+              <a:t>: write char </a:t>
+            </a:r>
+            <a:r>
+              <a:rPr lang="en-US" dirty="0" smtClean="0"/>
+              <a:t>(Error)</a:t>
+            </a:r>
+          </a:p>
+          <a:p>
+            <a:pPr marL="0" indent="0">
+              <a:buNone/>
+            </a:pPr>
+            <a:endParaRPr lang="en-US" dirty="0" smtClean="0"/>
+          </a:p>
+        </p:txBody>
+      </p:sp>
+    </p:spTree>
+    <p:extLst>
+      <p:ext uri="{BB962C8B-B14F-4D97-AF65-F5344CB8AC3E}">
+        <p14:creationId xmlns:p14="http://schemas.microsoft.com/office/powerpoint/2010/main" val="1604898833"/>
+      </p:ext>
+    </p:extLst>
+  </p:cSld>
+  <p:clrMapOvr>
+    <a:masterClrMapping/>
+  </p:clrMapOvr>
+  <p:timing>
+    <p:tnLst>
+      <p:par>
+        <p:cTn id="1" dur="indefinite" restart="never" nodeType="tmRoot"/>
+      </p:par>
+    </p:tnLst>
+  </p:timing>
+</p:sld>
+</file>
+
+<file path=ppt/slides/slide9.xml><?xml version="1.0" encoding="utf-8"?>
+<p:sld xmlns:a="http://schemas.openxmlformats.org/drawingml/2006/main" xmlns:r="http://schemas.openxmlformats.org/officeDocument/2006/relationships" xmlns:p="http://schemas.openxmlformats.org/presentationml/2006/main">
+  <p:cSld>
+    <p:spTree>
+      <p:nvGrpSpPr>
+        <p:cNvPr id="1" name=""/>
+        <p:cNvGrpSpPr/>
+        <p:nvPr/>
+      </p:nvGrpSpPr>
+      <p:grpSpPr>
+        <a:xfrm>
+          <a:off x="0" y="0"/>
+          <a:ext cx="0" cy="0"/>
+          <a:chOff x="0" y="0"/>
+          <a:chExt cx="0" cy="0"/>
+        </a:xfrm>
+      </p:grpSpPr>
+      <p:sp>
+        <p:nvSpPr>
+          <p:cNvPr id="2" name="Title 1"/>
+          <p:cNvSpPr>
+            <a:spLocks noGrp="1"/>
+          </p:cNvSpPr>
+          <p:nvPr>
+            <p:ph type="title"/>
+          </p:nvPr>
+        </p:nvSpPr>
+        <p:spPr/>
+        <p:txBody>
+          <a:bodyPr/>
+          <a:lstStyle/>
+          <a:p>
+            <a:r>
+              <a:rPr lang="de-CH" dirty="0" smtClean="0"/>
+              <a:t>Shell Parser</a:t>
+            </a:r>
+            <a:endParaRPr lang="de-CH" dirty="0"/>
+          </a:p>
+        </p:txBody>
+      </p:sp>
+      <p:pic>
+        <p:nvPicPr>
+          <p:cNvPr id="2050" name="Picture 2"/>
+          <p:cNvPicPr>
+            <a:picLocks noChangeAspect="1" noChangeArrowheads="1"/>
+          </p:cNvPicPr>
+          <p:nvPr/>
+        </p:nvPicPr>
+        <p:blipFill>
+          <a:blip r:embed="rId2">
+            <a:extLst>
+              <a:ext uri="{28A0092B-C50C-407E-A947-70E740481C1C}">
+                <a14:useLocalDpi xmlns:a14="http://schemas.microsoft.com/office/drawing/2010/main" val="0"/>
+              </a:ext>
+            </a:extLst>
+          </a:blip>
+          <a:srcRect/>
+          <a:stretch>
+            <a:fillRect/>
+          </a:stretch>
+        </p:blipFill>
+        <p:spPr bwMode="auto">
+          <a:xfrm>
+            <a:off x="179512" y="1844824"/>
+            <a:ext cx="8655233" cy="4097809"/>
+          </a:xfrm>
+          <a:prstGeom prst="rect">
+            <a:avLst/>
+          </a:prstGeom>
+          <a:noFill/>
+          <a:ln>
+            <a:noFill/>
+          </a:ln>
+          <a:effectLst/>
+          <a:extLst>
+            <a:ext uri="{909E8E84-426E-40DD-AFC4-6F175D3DCCD1}">
+              <a14:hiddenFill xmlns:a14="http://schemas.microsoft.com/office/drawing/2010/main">
+                <a:solidFill>
+                  <a:schemeClr val="accent1"/>
+                </a:solidFill>
+              </a14:hiddenFill>
+            </a:ext>
+            <a:ext uri="{91240B29-F687-4F45-9708-019B960494DF}">
+              <a14:hiddenLine xmlns:a14="http://schemas.microsoft.com/office/drawing/2010/main" w="9525">
+                <a:solidFill>
+                  <a:schemeClr val="tx1"/>
+                </a:solidFill>
+                <a:miter lim="800000"/>
+                <a:headEnd/>
+                <a:tailEnd/>
+              </a14:hiddenLine>
+            </a:ext>
+            <a:ext uri="{AF507438-7753-43E0-B8FC-AC1667EBCBE1}">
+              <a14:hiddenEffects xmlns:a14="http://schemas.microsoft.com/office/drawing/2010/main">
+                <a:effectLst>
+                  <a:outerShdw dist="35921" dir="2700000" algn="ctr" rotWithShape="0">
+                    <a:schemeClr val="bg2"/>
+                  </a:outerShdw>
+                </a:effectLst>
+              </a14:hiddenEffects>
+            </a:ext>
+          </a:extLst>
+        </p:spPr>
+      </p:pic>
+    </p:spTree>
+    <p:extLst>
+      <p:ext uri="{BB962C8B-B14F-4D97-AF65-F5344CB8AC3E}">
+        <p14:creationId xmlns:p14="http://schemas.microsoft.com/office/powerpoint/2010/main" val="3487330011"/>
+      </p:ext>
+    </p:extLst>
+  </p:cSld>
+  <p:clrMapOvr>
+    <a:masterClrMapping/>
+  </p:clrMapOvr>
+  <p:timing>
+    <p:tnLst>
+      <p:par>
+        <p:cTn id="1" dur="indefinite" restart="never" nodeType="tmRoot"/>
+      </p:par>
+    </p:tnLst>
+  </p:timing>
 </p:sld>
 </file>
 

</xml_diff>

<commit_message>
Recap added queue part
</commit_message>
<xml_diff>
--- a/Recap/Recap_SW8_Andyteil.pptx
+++ b/Recap/Recap_SW8_Andyteil.pptx
@@ -5,7 +5,7 @@
     <p:sldMasterId id="2147483648" r:id="rId1"/>
   </p:sldMasterIdLst>
   <p:notesMasterIdLst>
-    <p:notesMasterId r:id="rId16"/>
+    <p:notesMasterId r:id="rId19"/>
   </p:notesMasterIdLst>
   <p:sldIdLst>
     <p:sldId id="271" r:id="rId2"/>
@@ -22,6 +22,9 @@
     <p:sldId id="267" r:id="rId13"/>
     <p:sldId id="269" r:id="rId14"/>
     <p:sldId id="277" r:id="rId15"/>
+    <p:sldId id="278" r:id="rId16"/>
+    <p:sldId id="279" r:id="rId17"/>
+    <p:sldId id="280" r:id="rId18"/>
   </p:sldIdLst>
   <p:sldSz cx="9144000" cy="6858000" type="screen4x3"/>
   <p:notesSz cx="6858000" cy="9144000"/>
@@ -205,7 +208,7 @@
           <a:p>
             <a:fld id="{68EAC9E7-2673-47AD-A6C0-6979A29ECFE4}" type="datetimeFigureOut">
               <a:rPr lang="de-CH" smtClean="0"/>
-              <a:t>09.04.2014</a:t>
+              <a:t>14.04.2014</a:t>
             </a:fld>
             <a:endParaRPr lang="de-CH"/>
           </a:p>
@@ -654,7 +657,7 @@
           <a:p>
             <a:fld id="{4CEC8528-00A6-4125-98B0-6CCAFB2BC4BC}" type="datetimeFigureOut">
               <a:rPr lang="de-CH" smtClean="0"/>
-              <a:t>09.04.2014</a:t>
+              <a:t>14.04.2014</a:t>
             </a:fld>
             <a:endParaRPr lang="de-CH"/>
           </a:p>
@@ -824,7 +827,7 @@
           <a:p>
             <a:fld id="{4CEC8528-00A6-4125-98B0-6CCAFB2BC4BC}" type="datetimeFigureOut">
               <a:rPr lang="de-CH" smtClean="0"/>
-              <a:t>09.04.2014</a:t>
+              <a:t>14.04.2014</a:t>
             </a:fld>
             <a:endParaRPr lang="de-CH"/>
           </a:p>
@@ -1004,7 +1007,7 @@
           <a:p>
             <a:fld id="{4CEC8528-00A6-4125-98B0-6CCAFB2BC4BC}" type="datetimeFigureOut">
               <a:rPr lang="de-CH" smtClean="0"/>
-              <a:t>09.04.2014</a:t>
+              <a:t>14.04.2014</a:t>
             </a:fld>
             <a:endParaRPr lang="de-CH"/>
           </a:p>
@@ -1174,7 +1177,7 @@
           <a:p>
             <a:fld id="{4CEC8528-00A6-4125-98B0-6CCAFB2BC4BC}" type="datetimeFigureOut">
               <a:rPr lang="de-CH" smtClean="0"/>
-              <a:t>09.04.2014</a:t>
+              <a:t>14.04.2014</a:t>
             </a:fld>
             <a:endParaRPr lang="de-CH"/>
           </a:p>
@@ -1420,7 +1423,7 @@
           <a:p>
             <a:fld id="{4CEC8528-00A6-4125-98B0-6CCAFB2BC4BC}" type="datetimeFigureOut">
               <a:rPr lang="de-CH" smtClean="0"/>
-              <a:t>09.04.2014</a:t>
+              <a:t>14.04.2014</a:t>
             </a:fld>
             <a:endParaRPr lang="de-CH"/>
           </a:p>
@@ -1708,7 +1711,7 @@
           <a:p>
             <a:fld id="{4CEC8528-00A6-4125-98B0-6CCAFB2BC4BC}" type="datetimeFigureOut">
               <a:rPr lang="de-CH" smtClean="0"/>
-              <a:t>09.04.2014</a:t>
+              <a:t>14.04.2014</a:t>
             </a:fld>
             <a:endParaRPr lang="de-CH"/>
           </a:p>
@@ -2130,7 +2133,7 @@
           <a:p>
             <a:fld id="{4CEC8528-00A6-4125-98B0-6CCAFB2BC4BC}" type="datetimeFigureOut">
               <a:rPr lang="de-CH" smtClean="0"/>
-              <a:t>09.04.2014</a:t>
+              <a:t>14.04.2014</a:t>
             </a:fld>
             <a:endParaRPr lang="de-CH"/>
           </a:p>
@@ -2248,7 +2251,7 @@
           <a:p>
             <a:fld id="{4CEC8528-00A6-4125-98B0-6CCAFB2BC4BC}" type="datetimeFigureOut">
               <a:rPr lang="de-CH" smtClean="0"/>
-              <a:t>09.04.2014</a:t>
+              <a:t>14.04.2014</a:t>
             </a:fld>
             <a:endParaRPr lang="de-CH"/>
           </a:p>
@@ -2343,7 +2346,7 @@
           <a:p>
             <a:fld id="{4CEC8528-00A6-4125-98B0-6CCAFB2BC4BC}" type="datetimeFigureOut">
               <a:rPr lang="de-CH" smtClean="0"/>
-              <a:t>09.04.2014</a:t>
+              <a:t>14.04.2014</a:t>
             </a:fld>
             <a:endParaRPr lang="de-CH"/>
           </a:p>
@@ -2620,7 +2623,7 @@
           <a:p>
             <a:fld id="{4CEC8528-00A6-4125-98B0-6CCAFB2BC4BC}" type="datetimeFigureOut">
               <a:rPr lang="de-CH" smtClean="0"/>
-              <a:t>09.04.2014</a:t>
+              <a:t>14.04.2014</a:t>
             </a:fld>
             <a:endParaRPr lang="de-CH"/>
           </a:p>
@@ -2873,7 +2876,7 @@
           <a:p>
             <a:fld id="{4CEC8528-00A6-4125-98B0-6CCAFB2BC4BC}" type="datetimeFigureOut">
               <a:rPr lang="de-CH" smtClean="0"/>
-              <a:t>09.04.2014</a:t>
+              <a:t>14.04.2014</a:t>
             </a:fld>
             <a:endParaRPr lang="de-CH"/>
           </a:p>
@@ -3086,7 +3089,7 @@
           <a:p>
             <a:fld id="{4CEC8528-00A6-4125-98B0-6CCAFB2BC4BC}" type="datetimeFigureOut">
               <a:rPr lang="de-CH" smtClean="0"/>
-              <a:t>09.04.2014</a:t>
+              <a:t>14.04.2014</a:t>
             </a:fld>
             <a:endParaRPr lang="de-CH"/>
           </a:p>
@@ -4152,6 +4155,388 @@
       </p:par>
     </p:tnLst>
   </p:timing>
+</p:sld>
+</file>
+
+<file path=ppt/slides/slide15.xml><?xml version="1.0" encoding="utf-8"?>
+<p:sld xmlns:a="http://schemas.openxmlformats.org/drawingml/2006/main" xmlns:r="http://schemas.openxmlformats.org/officeDocument/2006/relationships" xmlns:p="http://schemas.openxmlformats.org/presentationml/2006/main">
+  <p:cSld>
+    <p:spTree>
+      <p:nvGrpSpPr>
+        <p:cNvPr id="1" name=""/>
+        <p:cNvGrpSpPr/>
+        <p:nvPr/>
+      </p:nvGrpSpPr>
+      <p:grpSpPr>
+        <a:xfrm>
+          <a:off x="0" y="0"/>
+          <a:ext cx="0" cy="0"/>
+          <a:chOff x="0" y="0"/>
+          <a:chExt cx="0" cy="0"/>
+        </a:xfrm>
+      </p:grpSpPr>
+      <p:sp>
+        <p:nvSpPr>
+          <p:cNvPr id="2" name="Titel 1"/>
+          <p:cNvSpPr txBox="1">
+            <a:spLocks/>
+          </p:cNvSpPr>
+          <p:nvPr/>
+        </p:nvSpPr>
+        <p:spPr>
+          <a:xfrm>
+            <a:off x="457200" y="274638"/>
+            <a:ext cx="8229600" cy="1143000"/>
+          </a:xfrm>
+          <a:prstGeom prst="rect">
+            <a:avLst/>
+          </a:prstGeom>
+        </p:spPr>
+        <p:txBody>
+          <a:bodyPr/>
+          <a:lstStyle>
+            <a:lvl1pPr algn="ctr" defTabSz="914400" rtl="0" eaLnBrk="1" latinLnBrk="0" hangingPunct="1">
+              <a:spcBef>
+                <a:spcPct val="0"/>
+              </a:spcBef>
+              <a:buNone/>
+              <a:defRPr sz="4400" kern="1200">
+                <a:solidFill>
+                  <a:schemeClr val="tx1"/>
+                </a:solidFill>
+                <a:latin typeface="+mj-lt"/>
+                <a:ea typeface="+mj-ea"/>
+                <a:cs typeface="+mj-cs"/>
+              </a:defRPr>
+            </a:lvl1pPr>
+          </a:lstStyle>
+          <a:p>
+            <a:r>
+              <a:rPr lang="de-CH" smtClean="0"/>
+              <a:t>Queue Create &amp; Delete</a:t>
+            </a:r>
+            <a:endParaRPr lang="de-CH" dirty="0"/>
+          </a:p>
+        </p:txBody>
+      </p:sp>
+      <p:pic>
+        <p:nvPicPr>
+          <p:cNvPr id="3" name="Picture 2"/>
+          <p:cNvPicPr>
+            <a:picLocks noChangeAspect="1" noChangeArrowheads="1"/>
+          </p:cNvPicPr>
+          <p:nvPr/>
+        </p:nvPicPr>
+        <p:blipFill rotWithShape="1">
+          <a:blip r:embed="rId2">
+            <a:extLst>
+              <a:ext uri="{28A0092B-C50C-407E-A947-70E740481C1C}">
+                <a14:useLocalDpi xmlns:a14="http://schemas.microsoft.com/office/drawing/2010/main" val="0"/>
+              </a:ext>
+            </a:extLst>
+          </a:blip>
+          <a:srcRect r="19910" b="5484"/>
+          <a:stretch/>
+        </p:blipFill>
+        <p:spPr bwMode="auto">
+          <a:xfrm>
+            <a:off x="1617915" y="1700808"/>
+            <a:ext cx="5908170" cy="4105632"/>
+          </a:xfrm>
+          <a:prstGeom prst="rect">
+            <a:avLst/>
+          </a:prstGeom>
+          <a:noFill/>
+          <a:ln>
+            <a:noFill/>
+          </a:ln>
+          <a:extLst>
+            <a:ext uri="{909E8E84-426E-40DD-AFC4-6F175D3DCCD1}">
+              <a14:hiddenFill xmlns:a14="http://schemas.microsoft.com/office/drawing/2010/main">
+                <a:solidFill>
+                  <a:schemeClr val="accent1"/>
+                </a:solidFill>
+              </a14:hiddenFill>
+            </a:ext>
+            <a:ext uri="{91240B29-F687-4F45-9708-019B960494DF}">
+              <a14:hiddenLine xmlns:a14="http://schemas.microsoft.com/office/drawing/2010/main" w="9525">
+                <a:solidFill>
+                  <a:schemeClr val="tx1"/>
+                </a:solidFill>
+                <a:miter lim="800000"/>
+                <a:headEnd/>
+                <a:tailEnd/>
+              </a14:hiddenLine>
+            </a:ext>
+          </a:extLst>
+        </p:spPr>
+      </p:pic>
+    </p:spTree>
+    <p:extLst>
+      <p:ext uri="{BB962C8B-B14F-4D97-AF65-F5344CB8AC3E}">
+        <p14:creationId xmlns:p14="http://schemas.microsoft.com/office/powerpoint/2010/main" val="3021596710"/>
+      </p:ext>
+    </p:extLst>
+  </p:cSld>
+  <p:clrMapOvr>
+    <a:masterClrMapping/>
+  </p:clrMapOvr>
+</p:sld>
+</file>
+
+<file path=ppt/slides/slide16.xml><?xml version="1.0" encoding="utf-8"?>
+<p:sld xmlns:a="http://schemas.openxmlformats.org/drawingml/2006/main" xmlns:r="http://schemas.openxmlformats.org/officeDocument/2006/relationships" xmlns:p="http://schemas.openxmlformats.org/presentationml/2006/main">
+  <p:cSld>
+    <p:spTree>
+      <p:nvGrpSpPr>
+        <p:cNvPr id="1" name=""/>
+        <p:cNvGrpSpPr/>
+        <p:nvPr/>
+      </p:nvGrpSpPr>
+      <p:grpSpPr>
+        <a:xfrm>
+          <a:off x="0" y="0"/>
+          <a:ext cx="0" cy="0"/>
+          <a:chOff x="0" y="0"/>
+          <a:chExt cx="0" cy="0"/>
+        </a:xfrm>
+      </p:grpSpPr>
+      <p:sp>
+        <p:nvSpPr>
+          <p:cNvPr id="2" name="Titel 1"/>
+          <p:cNvSpPr txBox="1">
+            <a:spLocks/>
+          </p:cNvSpPr>
+          <p:nvPr/>
+        </p:nvSpPr>
+        <p:spPr>
+          <a:xfrm>
+            <a:off x="457200" y="274638"/>
+            <a:ext cx="8229600" cy="1143000"/>
+          </a:xfrm>
+          <a:prstGeom prst="rect">
+            <a:avLst/>
+          </a:prstGeom>
+        </p:spPr>
+        <p:txBody>
+          <a:bodyPr/>
+          <a:lstStyle>
+            <a:lvl1pPr algn="ctr" defTabSz="914400" rtl="0" eaLnBrk="1" latinLnBrk="0" hangingPunct="1">
+              <a:spcBef>
+                <a:spcPct val="0"/>
+              </a:spcBef>
+              <a:buNone/>
+              <a:defRPr sz="4400" kern="1200">
+                <a:solidFill>
+                  <a:schemeClr val="tx1"/>
+                </a:solidFill>
+                <a:latin typeface="+mj-lt"/>
+                <a:ea typeface="+mj-ea"/>
+                <a:cs typeface="+mj-cs"/>
+              </a:defRPr>
+            </a:lvl1pPr>
+          </a:lstStyle>
+          <a:p>
+            <a:r>
+              <a:rPr lang="de-CH" smtClean="0"/>
+              <a:t>Queue Send</a:t>
+            </a:r>
+            <a:endParaRPr lang="de-CH" dirty="0"/>
+          </a:p>
+        </p:txBody>
+      </p:sp>
+      <p:pic>
+        <p:nvPicPr>
+          <p:cNvPr id="3" name="Picture 2"/>
+          <p:cNvPicPr>
+            <a:picLocks noChangeAspect="1" noChangeArrowheads="1"/>
+          </p:cNvPicPr>
+          <p:nvPr/>
+        </p:nvPicPr>
+        <p:blipFill>
+          <a:blip r:embed="rId2">
+            <a:extLst>
+              <a:ext uri="{28A0092B-C50C-407E-A947-70E740481C1C}">
+                <a14:useLocalDpi xmlns:a14="http://schemas.microsoft.com/office/drawing/2010/main" val="0"/>
+              </a:ext>
+            </a:extLst>
+          </a:blip>
+          <a:srcRect/>
+          <a:stretch>
+            <a:fillRect/>
+          </a:stretch>
+        </p:blipFill>
+        <p:spPr bwMode="auto">
+          <a:xfrm>
+            <a:off x="1618200" y="1628800"/>
+            <a:ext cx="5907600" cy="3507124"/>
+          </a:xfrm>
+          <a:prstGeom prst="rect">
+            <a:avLst/>
+          </a:prstGeom>
+          <a:noFill/>
+          <a:ln>
+            <a:noFill/>
+          </a:ln>
+          <a:extLst>
+            <a:ext uri="{909E8E84-426E-40DD-AFC4-6F175D3DCCD1}">
+              <a14:hiddenFill xmlns:a14="http://schemas.microsoft.com/office/drawing/2010/main">
+                <a:solidFill>
+                  <a:schemeClr val="accent1"/>
+                </a:solidFill>
+              </a14:hiddenFill>
+            </a:ext>
+            <a:ext uri="{91240B29-F687-4F45-9708-019B960494DF}">
+              <a14:hiddenLine xmlns:a14="http://schemas.microsoft.com/office/drawing/2010/main" w="9525">
+                <a:solidFill>
+                  <a:schemeClr val="tx1"/>
+                </a:solidFill>
+                <a:miter lim="800000"/>
+                <a:headEnd/>
+                <a:tailEnd/>
+              </a14:hiddenLine>
+            </a:ext>
+          </a:extLst>
+        </p:spPr>
+      </p:pic>
+    </p:spTree>
+    <p:extLst>
+      <p:ext uri="{BB962C8B-B14F-4D97-AF65-F5344CB8AC3E}">
+        <p14:creationId xmlns:p14="http://schemas.microsoft.com/office/powerpoint/2010/main" val="2808578188"/>
+      </p:ext>
+    </p:extLst>
+  </p:cSld>
+  <p:clrMapOvr>
+    <a:masterClrMapping/>
+  </p:clrMapOvr>
+</p:sld>
+</file>
+
+<file path=ppt/slides/slide17.xml><?xml version="1.0" encoding="utf-8"?>
+<p:sld xmlns:a="http://schemas.openxmlformats.org/drawingml/2006/main" xmlns:r="http://schemas.openxmlformats.org/officeDocument/2006/relationships" xmlns:p="http://schemas.openxmlformats.org/presentationml/2006/main">
+  <p:cSld>
+    <p:spTree>
+      <p:nvGrpSpPr>
+        <p:cNvPr id="1" name=""/>
+        <p:cNvGrpSpPr/>
+        <p:nvPr/>
+      </p:nvGrpSpPr>
+      <p:grpSpPr>
+        <a:xfrm>
+          <a:off x="0" y="0"/>
+          <a:ext cx="0" cy="0"/>
+          <a:chOff x="0" y="0"/>
+          <a:chExt cx="0" cy="0"/>
+        </a:xfrm>
+      </p:grpSpPr>
+      <p:sp>
+        <p:nvSpPr>
+          <p:cNvPr id="2" name="Titel 1"/>
+          <p:cNvSpPr txBox="1">
+            <a:spLocks/>
+          </p:cNvSpPr>
+          <p:nvPr/>
+        </p:nvSpPr>
+        <p:spPr>
+          <a:xfrm>
+            <a:off x="457200" y="274638"/>
+            <a:ext cx="8229600" cy="1143000"/>
+          </a:xfrm>
+          <a:prstGeom prst="rect">
+            <a:avLst/>
+          </a:prstGeom>
+        </p:spPr>
+        <p:txBody>
+          <a:bodyPr/>
+          <a:lstStyle>
+            <a:lvl1pPr algn="ctr" defTabSz="914400" rtl="0" eaLnBrk="1" latinLnBrk="0" hangingPunct="1">
+              <a:spcBef>
+                <a:spcPct val="0"/>
+              </a:spcBef>
+              <a:buNone/>
+              <a:defRPr sz="4400" kern="1200">
+                <a:solidFill>
+                  <a:schemeClr val="tx1"/>
+                </a:solidFill>
+                <a:latin typeface="+mj-lt"/>
+                <a:ea typeface="+mj-ea"/>
+                <a:cs typeface="+mj-cs"/>
+              </a:defRPr>
+            </a:lvl1pPr>
+          </a:lstStyle>
+          <a:p>
+            <a:r>
+              <a:rPr lang="de-CH" smtClean="0"/>
+              <a:t>Queue Receive &amp; Peek</a:t>
+            </a:r>
+            <a:endParaRPr lang="de-CH" dirty="0"/>
+          </a:p>
+        </p:txBody>
+      </p:sp>
+      <p:pic>
+        <p:nvPicPr>
+          <p:cNvPr id="3" name="Picture 2"/>
+          <p:cNvPicPr>
+            <a:picLocks noChangeAspect="1" noChangeArrowheads="1"/>
+          </p:cNvPicPr>
+          <p:nvPr/>
+        </p:nvPicPr>
+        <p:blipFill>
+          <a:blip r:embed="rId2">
+            <a:extLst>
+              <a:ext uri="{28A0092B-C50C-407E-A947-70E740481C1C}">
+                <a14:useLocalDpi xmlns:a14="http://schemas.microsoft.com/office/drawing/2010/main" val="0"/>
+              </a:ext>
+            </a:extLst>
+          </a:blip>
+          <a:srcRect/>
+          <a:stretch>
+            <a:fillRect/>
+          </a:stretch>
+        </p:blipFill>
+        <p:spPr bwMode="auto">
+          <a:xfrm>
+            <a:off x="1618200" y="1794228"/>
+            <a:ext cx="5907600" cy="3269544"/>
+          </a:xfrm>
+          <a:prstGeom prst="rect">
+            <a:avLst/>
+          </a:prstGeom>
+          <a:noFill/>
+          <a:ln>
+            <a:noFill/>
+          </a:ln>
+          <a:extLst>
+            <a:ext uri="{909E8E84-426E-40DD-AFC4-6F175D3DCCD1}">
+              <a14:hiddenFill xmlns:a14="http://schemas.microsoft.com/office/drawing/2010/main">
+                <a:solidFill>
+                  <a:schemeClr val="accent1"/>
+                </a:solidFill>
+              </a14:hiddenFill>
+            </a:ext>
+            <a:ext uri="{91240B29-F687-4F45-9708-019B960494DF}">
+              <a14:hiddenLine xmlns:a14="http://schemas.microsoft.com/office/drawing/2010/main" w="9525">
+                <a:solidFill>
+                  <a:schemeClr val="tx1"/>
+                </a:solidFill>
+                <a:miter lim="800000"/>
+                <a:headEnd/>
+                <a:tailEnd/>
+              </a14:hiddenLine>
+            </a:ext>
+          </a:extLst>
+        </p:spPr>
+      </p:pic>
+    </p:spTree>
+    <p:extLst>
+      <p:ext uri="{BB962C8B-B14F-4D97-AF65-F5344CB8AC3E}">
+        <p14:creationId xmlns:p14="http://schemas.microsoft.com/office/powerpoint/2010/main" val="2256351289"/>
+      </p:ext>
+    </p:extLst>
+  </p:cSld>
+  <p:clrMapOvr>
+    <a:masterClrMapping/>
+  </p:clrMapOvr>
 </p:sld>
 </file>
 

</xml_diff>